<commit_message>
going back to local storage token
</commit_message>
<xml_diff>
--- a/Presentation_projet_SocialMedia.pptx
+++ b/Presentation_projet_SocialMedia.pptx
@@ -12,19 +12,25 @@
     <p:sldId id="258" r:id="rId6"/>
     <p:sldId id="259" r:id="rId7"/>
     <p:sldId id="260" r:id="rId8"/>
-    <p:sldId id="261" r:id="rId9"/>
-    <p:sldId id="262" r:id="rId10"/>
-    <p:sldId id="264" r:id="rId11"/>
-    <p:sldId id="263" r:id="rId12"/>
-    <p:sldId id="265" r:id="rId13"/>
-    <p:sldId id="267" r:id="rId14"/>
-    <p:sldId id="270" r:id="rId15"/>
-    <p:sldId id="268" r:id="rId16"/>
-    <p:sldId id="271" r:id="rId17"/>
-    <p:sldId id="272" r:id="rId18"/>
-    <p:sldId id="273" r:id="rId19"/>
-    <p:sldId id="276" r:id="rId20"/>
-    <p:sldId id="275" r:id="rId21"/>
+    <p:sldId id="282" r:id="rId9"/>
+    <p:sldId id="261" r:id="rId10"/>
+    <p:sldId id="262" r:id="rId11"/>
+    <p:sldId id="264" r:id="rId12"/>
+    <p:sldId id="263" r:id="rId13"/>
+    <p:sldId id="279" r:id="rId14"/>
+    <p:sldId id="265" r:id="rId15"/>
+    <p:sldId id="280" r:id="rId16"/>
+    <p:sldId id="281" r:id="rId17"/>
+    <p:sldId id="267" r:id="rId18"/>
+    <p:sldId id="270" r:id="rId19"/>
+    <p:sldId id="268" r:id="rId20"/>
+    <p:sldId id="271" r:id="rId21"/>
+    <p:sldId id="272" r:id="rId22"/>
+    <p:sldId id="273" r:id="rId23"/>
+    <p:sldId id="277" r:id="rId24"/>
+    <p:sldId id="276" r:id="rId25"/>
+    <p:sldId id="275" r:id="rId26"/>
+    <p:sldId id="278" r:id="rId27"/>
   </p:sldIdLst>
   <p:sldSz cx="12192000" cy="6858000"/>
   <p:notesSz cx="6858000" cy="9144000"/>
@@ -855,7 +861,7 @@
           <a:p>
             <a:fld id="{FF74CC3B-96B1-4887-86FE-56E033E3D752}" type="datetimeFigureOut">
               <a:rPr lang="fr-FR" smtClean="0"/>
-              <a:t>25/11/2024</a:t>
+              <a:t>27/11/2024</a:t>
             </a:fld>
             <a:endParaRPr lang="fr-FR"/>
           </a:p>
@@ -1106,7 +1112,7 @@
           <a:p>
             <a:fld id="{FF74CC3B-96B1-4887-86FE-56E033E3D752}" type="datetimeFigureOut">
               <a:rPr lang="fr-FR" smtClean="0"/>
-              <a:t>25/11/2024</a:t>
+              <a:t>27/11/2024</a:t>
             </a:fld>
             <a:endParaRPr lang="fr-FR"/>
           </a:p>
@@ -1420,7 +1426,7 @@
           <a:p>
             <a:fld id="{FF74CC3B-96B1-4887-86FE-56E033E3D752}" type="datetimeFigureOut">
               <a:rPr lang="fr-FR" smtClean="0"/>
-              <a:t>25/11/2024</a:t>
+              <a:t>27/11/2024</a:t>
             </a:fld>
             <a:endParaRPr lang="fr-FR"/>
           </a:p>
@@ -1747,7 +1753,7 @@
           <a:p>
             <a:fld id="{FF74CC3B-96B1-4887-86FE-56E033E3D752}" type="datetimeFigureOut">
               <a:rPr lang="fr-FR" smtClean="0"/>
-              <a:t>25/11/2024</a:t>
+              <a:t>27/11/2024</a:t>
             </a:fld>
             <a:endParaRPr lang="fr-FR"/>
           </a:p>
@@ -2061,7 +2067,7 @@
           <a:p>
             <a:fld id="{FF74CC3B-96B1-4887-86FE-56E033E3D752}" type="datetimeFigureOut">
               <a:rPr lang="fr-FR" smtClean="0"/>
-              <a:t>25/11/2024</a:t>
+              <a:t>27/11/2024</a:t>
             </a:fld>
             <a:endParaRPr lang="fr-FR"/>
           </a:p>
@@ -2448,7 +2454,7 @@
           <a:p>
             <a:fld id="{FF74CC3B-96B1-4887-86FE-56E033E3D752}" type="datetimeFigureOut">
               <a:rPr lang="fr-FR" smtClean="0"/>
-              <a:t>25/11/2024</a:t>
+              <a:t>27/11/2024</a:t>
             </a:fld>
             <a:endParaRPr lang="fr-FR"/>
           </a:p>
@@ -2618,7 +2624,7 @@
           <a:p>
             <a:fld id="{FF74CC3B-96B1-4887-86FE-56E033E3D752}" type="datetimeFigureOut">
               <a:rPr lang="fr-FR" smtClean="0"/>
-              <a:t>25/11/2024</a:t>
+              <a:t>27/11/2024</a:t>
             </a:fld>
             <a:endParaRPr lang="fr-FR"/>
           </a:p>
@@ -2798,7 +2804,7 @@
           <a:p>
             <a:fld id="{FF74CC3B-96B1-4887-86FE-56E033E3D752}" type="datetimeFigureOut">
               <a:rPr lang="fr-FR" smtClean="0"/>
-              <a:t>25/11/2024</a:t>
+              <a:t>27/11/2024</a:t>
             </a:fld>
             <a:endParaRPr lang="fr-FR"/>
           </a:p>
@@ -2974,7 +2980,7 @@
           <a:p>
             <a:fld id="{FF74CC3B-96B1-4887-86FE-56E033E3D752}" type="datetimeFigureOut">
               <a:rPr lang="fr-FR" smtClean="0"/>
-              <a:t>25/11/2024</a:t>
+              <a:t>27/11/2024</a:t>
             </a:fld>
             <a:endParaRPr lang="fr-FR"/>
           </a:p>
@@ -3221,7 +3227,7 @@
           <a:p>
             <a:fld id="{FF74CC3B-96B1-4887-86FE-56E033E3D752}" type="datetimeFigureOut">
               <a:rPr lang="fr-FR" smtClean="0"/>
-              <a:t>25/11/2024</a:t>
+              <a:t>27/11/2024</a:t>
             </a:fld>
             <a:endParaRPr lang="fr-FR"/>
           </a:p>
@@ -3453,7 +3459,7 @@
           <a:p>
             <a:fld id="{FF74CC3B-96B1-4887-86FE-56E033E3D752}" type="datetimeFigureOut">
               <a:rPr lang="fr-FR" smtClean="0"/>
-              <a:t>25/11/2024</a:t>
+              <a:t>27/11/2024</a:t>
             </a:fld>
             <a:endParaRPr lang="fr-FR"/>
           </a:p>
@@ -3827,7 +3833,7 @@
           <a:p>
             <a:fld id="{FF74CC3B-96B1-4887-86FE-56E033E3D752}" type="datetimeFigureOut">
               <a:rPr lang="fr-FR" smtClean="0"/>
-              <a:t>25/11/2024</a:t>
+              <a:t>27/11/2024</a:t>
             </a:fld>
             <a:endParaRPr lang="fr-FR"/>
           </a:p>
@@ -3950,7 +3956,7 @@
           <a:p>
             <a:fld id="{FF74CC3B-96B1-4887-86FE-56E033E3D752}" type="datetimeFigureOut">
               <a:rPr lang="fr-FR" smtClean="0"/>
-              <a:t>25/11/2024</a:t>
+              <a:t>27/11/2024</a:t>
             </a:fld>
             <a:endParaRPr lang="fr-FR"/>
           </a:p>
@@ -4045,7 +4051,7 @@
           <a:p>
             <a:fld id="{FF74CC3B-96B1-4887-86FE-56E033E3D752}" type="datetimeFigureOut">
               <a:rPr lang="fr-FR" smtClean="0"/>
-              <a:t>25/11/2024</a:t>
+              <a:t>27/11/2024</a:t>
             </a:fld>
             <a:endParaRPr lang="fr-FR"/>
           </a:p>
@@ -4300,7 +4306,7 @@
           <a:p>
             <a:fld id="{FF74CC3B-96B1-4887-86FE-56E033E3D752}" type="datetimeFigureOut">
               <a:rPr lang="fr-FR" smtClean="0"/>
-              <a:t>25/11/2024</a:t>
+              <a:t>27/11/2024</a:t>
             </a:fld>
             <a:endParaRPr lang="fr-FR"/>
           </a:p>
@@ -4563,7 +4569,7 @@
           <a:p>
             <a:fld id="{FF74CC3B-96B1-4887-86FE-56E033E3D752}" type="datetimeFigureOut">
               <a:rPr lang="fr-FR" smtClean="0"/>
-              <a:t>25/11/2024</a:t>
+              <a:t>27/11/2024</a:t>
             </a:fld>
             <a:endParaRPr lang="fr-FR"/>
           </a:p>
@@ -5308,7 +5314,7 @@
           <a:p>
             <a:fld id="{FF74CC3B-96B1-4887-86FE-56E033E3D752}" type="datetimeFigureOut">
               <a:rPr lang="fr-FR" smtClean="0"/>
-              <a:t>25/11/2024</a:t>
+              <a:t>27/11/2024</a:t>
             </a:fld>
             <a:endParaRPr lang="fr-FR"/>
           </a:p>
@@ -5927,6 +5933,206 @@
           <p:cNvPr id="3" name="Espace réservé du contenu 2">
             <a:extLst>
               <a:ext uri="{FF2B5EF4-FFF2-40B4-BE49-F238E27FC236}">
+                <a16:creationId xmlns:a16="http://schemas.microsoft.com/office/drawing/2014/main" id="{669E923B-9B13-5BC0-740A-F1E04CDDBBCD}"/>
+              </a:ext>
+            </a:extLst>
+          </p:cNvPr>
+          <p:cNvSpPr>
+            <a:spLocks noGrp="1"/>
+          </p:cNvSpPr>
+          <p:nvPr>
+            <p:ph idx="1"/>
+          </p:nvPr>
+        </p:nvSpPr>
+        <p:spPr>
+          <a:xfrm>
+            <a:off x="661924" y="1211230"/>
+            <a:ext cx="3733640" cy="5357000"/>
+          </a:xfrm>
+        </p:spPr>
+        <p:txBody>
+          <a:bodyPr/>
+          <a:lstStyle/>
+          <a:p>
+            <a:r>
+              <a:rPr lang="fr-FR" dirty="0"/>
+              <a:t>Etape 2: Configuration des modèles</a:t>
+            </a:r>
+          </a:p>
+          <a:p>
+            <a:pPr marL="0" indent="0">
+              <a:buNone/>
+            </a:pPr>
+            <a:r>
+              <a:rPr lang="fr-FR" dirty="0"/>
+              <a:t>Utilisation de </a:t>
+            </a:r>
+            <a:r>
+              <a:rPr lang="fr-FR" dirty="0" err="1"/>
+              <a:t>Sequelize</a:t>
+            </a:r>
+            <a:r>
+              <a:rPr lang="fr-FR" dirty="0"/>
+              <a:t> pour définir la structure des modèles accordement à la BDD. </a:t>
+            </a:r>
+          </a:p>
+          <a:p>
+            <a:pPr marL="0" indent="0">
+              <a:buNone/>
+            </a:pPr>
+            <a:r>
+              <a:rPr lang="fr-FR" dirty="0" err="1"/>
+              <a:t>Sequelize</a:t>
+            </a:r>
+            <a:r>
+              <a:rPr lang="fr-FR" dirty="0"/>
+              <a:t> est un ORM, il permets de manipuler les tables dans </a:t>
+            </a:r>
+            <a:r>
+              <a:rPr lang="fr-FR" dirty="0" err="1"/>
+              <a:t>mySQL</a:t>
+            </a:r>
+            <a:r>
+              <a:rPr lang="fr-FR" dirty="0"/>
+              <a:t> comme si c’était des objets.</a:t>
+            </a:r>
+          </a:p>
+          <a:p>
+            <a:pPr marL="0" indent="0">
+              <a:buNone/>
+            </a:pPr>
+            <a:r>
+              <a:rPr lang="fr-FR" dirty="0"/>
+              <a:t>Création d’un fichier modelIndex.js pour définir les relations entre les modèles.</a:t>
+            </a:r>
+          </a:p>
+          <a:p>
+            <a:pPr marL="0" indent="0">
+              <a:buNone/>
+            </a:pPr>
+            <a:endParaRPr lang="fr-FR" dirty="0"/>
+          </a:p>
+          <a:p>
+            <a:pPr marL="0" indent="0">
+              <a:buNone/>
+            </a:pPr>
+            <a:endParaRPr lang="fr-FR" dirty="0"/>
+          </a:p>
+          <a:p>
+            <a:pPr marL="0" indent="0">
+              <a:buNone/>
+            </a:pPr>
+            <a:endParaRPr lang="fr-FR" dirty="0"/>
+          </a:p>
+        </p:txBody>
+      </p:sp>
+      <p:pic>
+        <p:nvPicPr>
+          <p:cNvPr id="7" name="Image 6">
+            <a:extLst>
+              <a:ext uri="{FF2B5EF4-FFF2-40B4-BE49-F238E27FC236}">
+                <a16:creationId xmlns:a16="http://schemas.microsoft.com/office/drawing/2014/main" id="{A2A7FA17-8C4F-CA97-1915-78A48A913BEA}"/>
+              </a:ext>
+            </a:extLst>
+          </p:cNvPr>
+          <p:cNvPicPr>
+            <a:picLocks noChangeAspect="1"/>
+          </p:cNvPicPr>
+          <p:nvPr/>
+        </p:nvPicPr>
+        <p:blipFill>
+          <a:blip r:embed="rId2">
+            <a:extLst>
+              <a:ext uri="{28A0092B-C50C-407E-A947-70E740481C1C}">
+                <a14:useLocalDpi xmlns:a14="http://schemas.microsoft.com/office/drawing/2010/main" val="0"/>
+              </a:ext>
+            </a:extLst>
+          </a:blip>
+          <a:stretch>
+            <a:fillRect/>
+          </a:stretch>
+        </p:blipFill>
+        <p:spPr>
+          <a:xfrm>
+            <a:off x="4817680" y="505652"/>
+            <a:ext cx="3744354" cy="1834982"/>
+          </a:xfrm>
+          <a:prstGeom prst="rect">
+            <a:avLst/>
+          </a:prstGeom>
+        </p:spPr>
+      </p:pic>
+      <p:pic>
+        <p:nvPicPr>
+          <p:cNvPr id="9" name="Image 8">
+            <a:extLst>
+              <a:ext uri="{FF2B5EF4-FFF2-40B4-BE49-F238E27FC236}">
+                <a16:creationId xmlns:a16="http://schemas.microsoft.com/office/drawing/2014/main" id="{D5F88461-B944-8FA4-BA3D-3CFAE5398947}"/>
+              </a:ext>
+            </a:extLst>
+          </p:cNvPr>
+          <p:cNvPicPr>
+            <a:picLocks noChangeAspect="1"/>
+          </p:cNvPicPr>
+          <p:nvPr/>
+        </p:nvPicPr>
+        <p:blipFill>
+          <a:blip r:embed="rId3">
+            <a:extLst>
+              <a:ext uri="{28A0092B-C50C-407E-A947-70E740481C1C}">
+                <a14:useLocalDpi xmlns:a14="http://schemas.microsoft.com/office/drawing/2010/main" val="0"/>
+              </a:ext>
+            </a:extLst>
+          </a:blip>
+          <a:stretch>
+            <a:fillRect/>
+          </a:stretch>
+        </p:blipFill>
+        <p:spPr>
+          <a:xfrm>
+            <a:off x="4817680" y="2724615"/>
+            <a:ext cx="3733640" cy="3843615"/>
+          </a:xfrm>
+          <a:prstGeom prst="rect">
+            <a:avLst/>
+          </a:prstGeom>
+        </p:spPr>
+      </p:pic>
+    </p:spTree>
+    <p:extLst>
+      <p:ext uri="{BB962C8B-B14F-4D97-AF65-F5344CB8AC3E}">
+        <p14:creationId xmlns:p14="http://schemas.microsoft.com/office/powerpoint/2010/main" val="2476426381"/>
+      </p:ext>
+    </p:extLst>
+  </p:cSld>
+  <p:clrMapOvr>
+    <a:masterClrMapping/>
+  </p:clrMapOvr>
+</p:sld>
+</file>
+
+<file path=ppt/slides/slide11.xml><?xml version="1.0" encoding="utf-8"?>
+<p:sld xmlns:a="http://schemas.openxmlformats.org/drawingml/2006/main" xmlns:r="http://schemas.openxmlformats.org/officeDocument/2006/relationships" xmlns:p="http://schemas.openxmlformats.org/presentationml/2006/main">
+  <p:cSld>
+    <p:spTree>
+      <p:nvGrpSpPr>
+        <p:cNvPr id="1" name=""/>
+        <p:cNvGrpSpPr/>
+        <p:nvPr/>
+      </p:nvGrpSpPr>
+      <p:grpSpPr>
+        <a:xfrm>
+          <a:off x="0" y="0"/>
+          <a:ext cx="0" cy="0"/>
+          <a:chOff x="0" y="0"/>
+          <a:chExt cx="0" cy="0"/>
+        </a:xfrm>
+      </p:grpSpPr>
+      <p:sp>
+        <p:nvSpPr>
+          <p:cNvPr id="3" name="Espace réservé du contenu 2">
+            <a:extLst>
+              <a:ext uri="{FF2B5EF4-FFF2-40B4-BE49-F238E27FC236}">
                 <a16:creationId xmlns:a16="http://schemas.microsoft.com/office/drawing/2014/main" id="{B9DAD70B-6005-C1AE-8E3D-1089DC2CA875}"/>
               </a:ext>
             </a:extLst>
@@ -5940,7 +6146,7 @@
         </p:nvSpPr>
         <p:spPr>
           <a:xfrm>
-            <a:off x="677334" y="431321"/>
+            <a:off x="682304" y="734464"/>
             <a:ext cx="4809066" cy="5610041"/>
           </a:xfrm>
         </p:spPr>
@@ -5977,15 +6183,7 @@
             </a:pPr>
             <a:r>
               <a:rPr lang="fr-FR" dirty="0"/>
-              <a:t>Autorisation de la </a:t>
-            </a:r>
-            <a:r>
-              <a:rPr lang="fr-FR" dirty="0" err="1"/>
-              <a:t>connection</a:t>
-            </a:r>
-            <a:r>
-              <a:rPr lang="fr-FR" dirty="0"/>
-              <a:t> CORS pour le </a:t>
+              <a:t>Autorisation de la connexion CORS pour le </a:t>
             </a:r>
             <a:r>
               <a:rPr lang="fr-FR" dirty="0" err="1"/>
@@ -6066,7 +6264,7 @@
         </p:blipFill>
         <p:spPr>
           <a:xfrm>
-            <a:off x="5900315" y="3803250"/>
+            <a:off x="5900315" y="3474477"/>
             <a:ext cx="3899592" cy="2254917"/>
           </a:xfrm>
           <a:prstGeom prst="rect">
@@ -6102,7 +6300,7 @@
         </p:blipFill>
         <p:spPr>
           <a:xfrm>
-            <a:off x="5900315" y="929425"/>
+            <a:off x="5900315" y="734464"/>
             <a:ext cx="3899592" cy="2125325"/>
           </a:xfrm>
           <a:prstGeom prst="rect">
@@ -6114,337 +6312,6 @@
     <p:extLst>
       <p:ext uri="{BB962C8B-B14F-4D97-AF65-F5344CB8AC3E}">
         <p14:creationId xmlns:p14="http://schemas.microsoft.com/office/powerpoint/2010/main" val="787806164"/>
-      </p:ext>
-    </p:extLst>
-  </p:cSld>
-  <p:clrMapOvr>
-    <a:masterClrMapping/>
-  </p:clrMapOvr>
-</p:sld>
-</file>
-
-<file path=ppt/slides/slide11.xml><?xml version="1.0" encoding="utf-8"?>
-<p:sld xmlns:a="http://schemas.openxmlformats.org/drawingml/2006/main" xmlns:r="http://schemas.openxmlformats.org/officeDocument/2006/relationships" xmlns:p="http://schemas.openxmlformats.org/presentationml/2006/main">
-  <p:cSld>
-    <p:spTree>
-      <p:nvGrpSpPr>
-        <p:cNvPr id="1" name=""/>
-        <p:cNvGrpSpPr/>
-        <p:nvPr/>
-      </p:nvGrpSpPr>
-      <p:grpSpPr>
-        <a:xfrm>
-          <a:off x="0" y="0"/>
-          <a:ext cx="0" cy="0"/>
-          <a:chOff x="0" y="0"/>
-          <a:chExt cx="0" cy="0"/>
-        </a:xfrm>
-      </p:grpSpPr>
-      <p:sp>
-        <p:nvSpPr>
-          <p:cNvPr id="3" name="Espace réservé du contenu 2">
-            <a:extLst>
-              <a:ext uri="{FF2B5EF4-FFF2-40B4-BE49-F238E27FC236}">
-                <a16:creationId xmlns:a16="http://schemas.microsoft.com/office/drawing/2014/main" id="{E88AA219-69A7-D49A-6A67-7E1B08B09FA2}"/>
-              </a:ext>
-            </a:extLst>
-          </p:cNvPr>
-          <p:cNvSpPr>
-            <a:spLocks noGrp="1"/>
-          </p:cNvSpPr>
-          <p:nvPr>
-            <p:ph idx="1"/>
-          </p:nvPr>
-        </p:nvSpPr>
-        <p:spPr>
-          <a:xfrm>
-            <a:off x="700338" y="406551"/>
-            <a:ext cx="8662198" cy="5850475"/>
-          </a:xfrm>
-        </p:spPr>
-        <p:txBody>
-          <a:bodyPr>
-            <a:normAutofit/>
-          </a:bodyPr>
-          <a:lstStyle/>
-          <a:p>
-            <a:r>
-              <a:rPr lang="fr-FR" dirty="0"/>
-              <a:t>Etape 4: Mise en place des </a:t>
-            </a:r>
-            <a:r>
-              <a:rPr lang="fr-FR" dirty="0" err="1"/>
-              <a:t>controllers</a:t>
-            </a:r>
-            <a:r>
-              <a:rPr lang="fr-FR" dirty="0"/>
-              <a:t>.</a:t>
-            </a:r>
-          </a:p>
-          <a:p>
-            <a:pPr marL="0" indent="0">
-              <a:buNone/>
-            </a:pPr>
-            <a:r>
-              <a:rPr lang="fr-FR" dirty="0"/>
-              <a:t>Les </a:t>
-            </a:r>
-            <a:r>
-              <a:rPr lang="fr-FR" dirty="0" err="1"/>
-              <a:t>controllers</a:t>
-            </a:r>
-            <a:r>
-              <a:rPr lang="fr-FR" dirty="0"/>
-              <a:t> contiennent la logique métier de nos modèles. On définit les fonctions à effectuer dans l’ordre avant d’envoyer la requête. </a:t>
-            </a:r>
-          </a:p>
-          <a:p>
-            <a:pPr marL="0" indent="0">
-              <a:buNone/>
-            </a:pPr>
-            <a:r>
-              <a:rPr lang="fr-FR" dirty="0"/>
-              <a:t>Pour rappel, avec </a:t>
-            </a:r>
-            <a:r>
-              <a:rPr lang="fr-FR" dirty="0" err="1"/>
-              <a:t>sequelize</a:t>
-            </a:r>
-            <a:r>
-              <a:rPr lang="fr-FR" dirty="0"/>
-              <a:t> les fonctions CRUD sont </a:t>
-            </a:r>
-            <a:r>
-              <a:rPr lang="fr-FR" dirty="0" err="1"/>
-              <a:t>findAll</a:t>
-            </a:r>
-            <a:r>
-              <a:rPr lang="fr-FR" dirty="0"/>
-              <a:t>(), </a:t>
-            </a:r>
-            <a:r>
-              <a:rPr lang="fr-FR" dirty="0" err="1"/>
-              <a:t>findOne</a:t>
-            </a:r>
-            <a:r>
-              <a:rPr lang="fr-FR" dirty="0"/>
-              <a:t>(</a:t>
-            </a:r>
-            <a:r>
-              <a:rPr lang="fr-FR" dirty="0" err="1"/>
-              <a:t>where</a:t>
-            </a:r>
-            <a:r>
-              <a:rPr lang="fr-FR" dirty="0"/>
-              <a:t>) ou </a:t>
-            </a:r>
-            <a:r>
-              <a:rPr lang="fr-FR" dirty="0" err="1"/>
-              <a:t>findByPk</a:t>
-            </a:r>
-            <a:r>
-              <a:rPr lang="fr-FR" dirty="0"/>
-              <a:t>(id), .</a:t>
-            </a:r>
-            <a:r>
-              <a:rPr lang="fr-FR" dirty="0" err="1"/>
-              <a:t>create</a:t>
-            </a:r>
-            <a:r>
-              <a:rPr lang="fr-FR" dirty="0"/>
-              <a:t>, .restore, .update et .destroy.</a:t>
-            </a:r>
-          </a:p>
-          <a:p>
-            <a:pPr marL="0" indent="0">
-              <a:buNone/>
-            </a:pPr>
-            <a:r>
-              <a:rPr lang="fr-FR" dirty="0"/>
-              <a:t>Points à retenir:</a:t>
-            </a:r>
-          </a:p>
-          <a:p>
-            <a:pPr marL="0" indent="0">
-              <a:buNone/>
-            </a:pPr>
-            <a:r>
-              <a:rPr lang="fr-FR" dirty="0"/>
-              <a:t>Pour la fonction </a:t>
-            </a:r>
-            <a:r>
-              <a:rPr lang="fr-FR" dirty="0" err="1"/>
-              <a:t>Signup</a:t>
-            </a:r>
-            <a:r>
-              <a:rPr lang="fr-FR" dirty="0"/>
-              <a:t>: </a:t>
-            </a:r>
-          </a:p>
-          <a:p>
-            <a:pPr marL="0" indent="0">
-              <a:buNone/>
-            </a:pPr>
-            <a:r>
-              <a:rPr lang="fr-FR" dirty="0"/>
-              <a:t>-Utilisation de la fonction </a:t>
-            </a:r>
-            <a:r>
-              <a:rPr lang="fr-FR" dirty="0" err="1"/>
-              <a:t>bcrypt.hash</a:t>
-            </a:r>
-            <a:r>
-              <a:rPr lang="fr-FR" dirty="0"/>
-              <a:t> pour crypter le mot de passe utilisateur.</a:t>
-            </a:r>
-          </a:p>
-          <a:p>
-            <a:pPr marL="0" indent="0">
-              <a:buNone/>
-            </a:pPr>
-            <a:r>
-              <a:rPr lang="fr-FR" dirty="0"/>
-              <a:t>-Utilisation de la fonction .restore si l’utilisateur a supprimé son compte auparavant (soft </a:t>
-            </a:r>
-            <a:r>
-              <a:rPr lang="fr-FR" dirty="0" err="1"/>
-              <a:t>delete</a:t>
-            </a:r>
-            <a:r>
-              <a:rPr lang="fr-FR" dirty="0"/>
-              <a:t> mis en place par le </a:t>
-            </a:r>
-            <a:r>
-              <a:rPr lang="fr-FR" dirty="0" err="1"/>
-              <a:t>paranoid</a:t>
-            </a:r>
-            <a:r>
-              <a:rPr lang="fr-FR" dirty="0"/>
-              <a:t>: </a:t>
-            </a:r>
-            <a:r>
-              <a:rPr lang="fr-FR" dirty="0" err="1"/>
-              <a:t>true</a:t>
-            </a:r>
-            <a:r>
-              <a:rPr lang="fr-FR" dirty="0"/>
-              <a:t> auparavant)</a:t>
-            </a:r>
-          </a:p>
-          <a:p>
-            <a:pPr marL="0" indent="0">
-              <a:buNone/>
-            </a:pPr>
-            <a:r>
-              <a:rPr lang="fr-FR" dirty="0"/>
-              <a:t>Pour la fonction login:</a:t>
-            </a:r>
-          </a:p>
-          <a:p>
-            <a:pPr marL="0" indent="0">
-              <a:buNone/>
-            </a:pPr>
-            <a:r>
-              <a:rPr lang="fr-FR" dirty="0"/>
-              <a:t>-</a:t>
-            </a:r>
-            <a:r>
-              <a:rPr lang="fr-FR" dirty="0" err="1"/>
-              <a:t>bcrypt.compare</a:t>
-            </a:r>
-            <a:r>
-              <a:rPr lang="fr-FR" dirty="0"/>
-              <a:t> pour valider le mot de passe.</a:t>
-            </a:r>
-          </a:p>
-          <a:p>
-            <a:pPr marL="0" indent="0">
-              <a:buNone/>
-            </a:pPr>
-            <a:r>
-              <a:rPr lang="fr-FR" dirty="0"/>
-              <a:t>-utilisation de la fonction </a:t>
-            </a:r>
-            <a:r>
-              <a:rPr lang="fr-FR" dirty="0" err="1"/>
-              <a:t>jwt.sign</a:t>
-            </a:r>
-            <a:r>
-              <a:rPr lang="fr-FR" dirty="0"/>
-              <a:t> pour crypter dans un </a:t>
-            </a:r>
-            <a:r>
-              <a:rPr lang="fr-FR" dirty="0" err="1"/>
-              <a:t>payload</a:t>
-            </a:r>
-            <a:r>
-              <a:rPr lang="fr-FR" dirty="0"/>
-              <a:t> l’</a:t>
-            </a:r>
-            <a:r>
-              <a:rPr lang="fr-FR" dirty="0" err="1"/>
-              <a:t>user_id</a:t>
-            </a:r>
-            <a:r>
-              <a:rPr lang="fr-FR" dirty="0"/>
-              <a:t> et </a:t>
-            </a:r>
-            <a:r>
-              <a:rPr lang="fr-FR" dirty="0" err="1"/>
-              <a:t>role_id</a:t>
-            </a:r>
-            <a:r>
-              <a:rPr lang="fr-FR" dirty="0"/>
-              <a:t> de l’utilisateur (Ici dans les </a:t>
-            </a:r>
-            <a:r>
-              <a:rPr lang="fr-FR" dirty="0" err="1"/>
-              <a:t>cookiess</a:t>
-            </a:r>
-            <a:r>
-              <a:rPr lang="fr-FR" dirty="0"/>
-              <a:t>), </a:t>
-            </a:r>
-          </a:p>
-          <a:p>
-            <a:pPr marL="0" indent="0">
-              <a:buNone/>
-            </a:pPr>
-            <a:endParaRPr lang="fr-FR" b="0" dirty="0">
-              <a:solidFill>
-                <a:srgbClr val="CCCCCC"/>
-              </a:solidFill>
-              <a:effectLst/>
-              <a:latin typeface="Consolas" panose="020B0609020204030204" pitchFamily="49" charset="0"/>
-            </a:endParaRPr>
-          </a:p>
-          <a:p>
-            <a:pPr marL="0" indent="0">
-              <a:lnSpc>
-                <a:spcPts val="1425"/>
-              </a:lnSpc>
-              <a:buNone/>
-            </a:pPr>
-            <a:endParaRPr lang="fr-FR" b="0" dirty="0">
-              <a:solidFill>
-                <a:srgbClr val="CCCCCC"/>
-              </a:solidFill>
-              <a:effectLst/>
-              <a:latin typeface="Consolas" panose="020B0609020204030204" pitchFamily="49" charset="0"/>
-            </a:endParaRPr>
-          </a:p>
-          <a:p>
-            <a:pPr marL="0" indent="0">
-              <a:buNone/>
-            </a:pPr>
-            <a:endParaRPr lang="fr-FR" dirty="0"/>
-          </a:p>
-        </p:txBody>
-      </p:sp>
-    </p:spTree>
-    <p:extLst>
-      <p:ext uri="{BB962C8B-B14F-4D97-AF65-F5344CB8AC3E}">
-        <p14:creationId xmlns:p14="http://schemas.microsoft.com/office/powerpoint/2010/main" val="609389181"/>
       </p:ext>
     </p:extLst>
   </p:cSld>
@@ -6476,6 +6343,479 @@
           <p:cNvPr id="3" name="Espace réservé du contenu 2">
             <a:extLst>
               <a:ext uri="{FF2B5EF4-FFF2-40B4-BE49-F238E27FC236}">
+                <a16:creationId xmlns:a16="http://schemas.microsoft.com/office/drawing/2014/main" id="{E88AA219-69A7-D49A-6A67-7E1B08B09FA2}"/>
+              </a:ext>
+            </a:extLst>
+          </p:cNvPr>
+          <p:cNvSpPr>
+            <a:spLocks noGrp="1"/>
+          </p:cNvSpPr>
+          <p:nvPr>
+            <p:ph idx="1"/>
+          </p:nvPr>
+        </p:nvSpPr>
+        <p:spPr>
+          <a:xfrm>
+            <a:off x="700338" y="406551"/>
+            <a:ext cx="4328862" cy="5850475"/>
+          </a:xfrm>
+        </p:spPr>
+        <p:txBody>
+          <a:bodyPr>
+            <a:normAutofit lnSpcReduction="10000"/>
+          </a:bodyPr>
+          <a:lstStyle/>
+          <a:p>
+            <a:r>
+              <a:rPr lang="fr-FR" dirty="0"/>
+              <a:t>Etape 4: Mise en place des </a:t>
+            </a:r>
+            <a:r>
+              <a:rPr lang="fr-FR" dirty="0" err="1"/>
+              <a:t>controllers</a:t>
+            </a:r>
+            <a:r>
+              <a:rPr lang="fr-FR" dirty="0"/>
+              <a:t>.</a:t>
+            </a:r>
+          </a:p>
+          <a:p>
+            <a:pPr marL="0" indent="0">
+              <a:buNone/>
+            </a:pPr>
+            <a:r>
+              <a:rPr lang="fr-FR" dirty="0"/>
+              <a:t>Les </a:t>
+            </a:r>
+            <a:r>
+              <a:rPr lang="fr-FR" dirty="0" err="1"/>
+              <a:t>controllers</a:t>
+            </a:r>
+            <a:r>
+              <a:rPr lang="fr-FR" dirty="0"/>
+              <a:t> contiennent la logique métier de nos modèles. On définit les fonctions à effectuer dans l’ordre avant d’envoyer la requête. </a:t>
+            </a:r>
+          </a:p>
+          <a:p>
+            <a:pPr marL="0" indent="0">
+              <a:buNone/>
+            </a:pPr>
+            <a:r>
+              <a:rPr lang="fr-FR" dirty="0"/>
+              <a:t>Pour rappel, avec </a:t>
+            </a:r>
+            <a:r>
+              <a:rPr lang="fr-FR" dirty="0" err="1"/>
+              <a:t>sequelize</a:t>
+            </a:r>
+            <a:r>
+              <a:rPr lang="fr-FR" dirty="0"/>
+              <a:t> les fonctions CRUD sont </a:t>
+            </a:r>
+            <a:r>
+              <a:rPr lang="fr-FR" dirty="0" err="1"/>
+              <a:t>findAll</a:t>
+            </a:r>
+            <a:r>
+              <a:rPr lang="fr-FR" dirty="0"/>
+              <a:t>(), </a:t>
+            </a:r>
+            <a:r>
+              <a:rPr lang="fr-FR" dirty="0" err="1"/>
+              <a:t>findOne</a:t>
+            </a:r>
+            <a:r>
+              <a:rPr lang="fr-FR" dirty="0"/>
+              <a:t>(</a:t>
+            </a:r>
+            <a:r>
+              <a:rPr lang="fr-FR" dirty="0" err="1"/>
+              <a:t>where</a:t>
+            </a:r>
+            <a:r>
+              <a:rPr lang="fr-FR" dirty="0"/>
+              <a:t>) ou </a:t>
+            </a:r>
+            <a:r>
+              <a:rPr lang="fr-FR" dirty="0" err="1"/>
+              <a:t>findByPk</a:t>
+            </a:r>
+            <a:r>
+              <a:rPr lang="fr-FR" dirty="0"/>
+              <a:t>(id), .</a:t>
+            </a:r>
+            <a:r>
+              <a:rPr lang="fr-FR" dirty="0" err="1"/>
+              <a:t>create</a:t>
+            </a:r>
+            <a:r>
+              <a:rPr lang="fr-FR" dirty="0"/>
+              <a:t>, .restore, .update et .destroy.</a:t>
+            </a:r>
+          </a:p>
+          <a:p>
+            <a:pPr marL="0" indent="0">
+              <a:buNone/>
+            </a:pPr>
+            <a:r>
+              <a:rPr lang="fr-FR" dirty="0"/>
+              <a:t>Pour la fonction </a:t>
+            </a:r>
+            <a:r>
+              <a:rPr lang="fr-FR" dirty="0" err="1"/>
+              <a:t>Signup</a:t>
+            </a:r>
+            <a:r>
+              <a:rPr lang="fr-FR" dirty="0"/>
+              <a:t>:</a:t>
+            </a:r>
+          </a:p>
+          <a:p>
+            <a:pPr marL="0" indent="0">
+              <a:buNone/>
+            </a:pPr>
+            <a:r>
+              <a:rPr lang="fr-FR" dirty="0"/>
+              <a:t>-Installation de </a:t>
+            </a:r>
+            <a:r>
+              <a:rPr lang="fr-FR" dirty="0" err="1"/>
+              <a:t>bcrypt</a:t>
+            </a:r>
+            <a:r>
+              <a:rPr lang="fr-FR" dirty="0"/>
+              <a:t>: système de hachage unidirectionnel. </a:t>
+            </a:r>
+          </a:p>
+          <a:p>
+            <a:pPr marL="0" indent="0">
+              <a:buNone/>
+            </a:pPr>
+            <a:r>
+              <a:rPr lang="fr-FR" dirty="0"/>
+              <a:t>-Utilisation de la fonction </a:t>
+            </a:r>
+            <a:r>
+              <a:rPr lang="fr-FR" dirty="0" err="1"/>
+              <a:t>bcrypt.hash</a:t>
+            </a:r>
+            <a:r>
+              <a:rPr lang="fr-FR" dirty="0"/>
+              <a:t> pour crypter le mot de passe utilisateur.</a:t>
+            </a:r>
+          </a:p>
+          <a:p>
+            <a:pPr marL="0" indent="0">
+              <a:buNone/>
+            </a:pPr>
+            <a:r>
+              <a:rPr lang="fr-FR" dirty="0"/>
+              <a:t>-Utilisation de la fonction .restore si l’utilisateur a supprimé son compte auparavant (soft </a:t>
+            </a:r>
+            <a:r>
+              <a:rPr lang="fr-FR" dirty="0" err="1"/>
+              <a:t>delete</a:t>
+            </a:r>
+            <a:r>
+              <a:rPr lang="fr-FR" dirty="0"/>
+              <a:t> mis en place par le </a:t>
+            </a:r>
+            <a:r>
+              <a:rPr lang="fr-FR" dirty="0" err="1"/>
+              <a:t>paranoid</a:t>
+            </a:r>
+            <a:r>
+              <a:rPr lang="fr-FR" dirty="0"/>
+              <a:t>: </a:t>
+            </a:r>
+            <a:r>
+              <a:rPr lang="fr-FR" dirty="0" err="1"/>
+              <a:t>true</a:t>
+            </a:r>
+            <a:r>
+              <a:rPr lang="fr-FR" dirty="0"/>
+              <a:t> auparavant)</a:t>
+            </a:r>
+          </a:p>
+          <a:p>
+            <a:pPr marL="0" indent="0">
+              <a:lnSpc>
+                <a:spcPts val="1425"/>
+              </a:lnSpc>
+              <a:buNone/>
+            </a:pPr>
+            <a:endParaRPr lang="fr-FR" b="0" dirty="0">
+              <a:solidFill>
+                <a:srgbClr val="CCCCCC"/>
+              </a:solidFill>
+              <a:effectLst/>
+              <a:latin typeface="Consolas" panose="020B0609020204030204" pitchFamily="49" charset="0"/>
+            </a:endParaRPr>
+          </a:p>
+          <a:p>
+            <a:pPr marL="0" indent="0">
+              <a:buNone/>
+            </a:pPr>
+            <a:endParaRPr lang="fr-FR" dirty="0"/>
+          </a:p>
+        </p:txBody>
+      </p:sp>
+      <p:pic>
+        <p:nvPicPr>
+          <p:cNvPr id="6" name="Image 5">
+            <a:extLst>
+              <a:ext uri="{FF2B5EF4-FFF2-40B4-BE49-F238E27FC236}">
+                <a16:creationId xmlns:a16="http://schemas.microsoft.com/office/drawing/2014/main" id="{FB98B3CD-CF33-8381-7738-4324551F72DB}"/>
+              </a:ext>
+            </a:extLst>
+          </p:cNvPr>
+          <p:cNvPicPr>
+            <a:picLocks noChangeAspect="1"/>
+          </p:cNvPicPr>
+          <p:nvPr/>
+        </p:nvPicPr>
+        <p:blipFill>
+          <a:blip r:embed="rId2">
+            <a:extLst>
+              <a:ext uri="{28A0092B-C50C-407E-A947-70E740481C1C}">
+                <a14:useLocalDpi xmlns:a14="http://schemas.microsoft.com/office/drawing/2010/main" val="0"/>
+              </a:ext>
+            </a:extLst>
+          </a:blip>
+          <a:stretch>
+            <a:fillRect/>
+          </a:stretch>
+        </p:blipFill>
+        <p:spPr>
+          <a:xfrm>
+            <a:off x="5360436" y="1391479"/>
+            <a:ext cx="4551390" cy="3990792"/>
+          </a:xfrm>
+          <a:prstGeom prst="rect">
+            <a:avLst/>
+          </a:prstGeom>
+        </p:spPr>
+      </p:pic>
+    </p:spTree>
+    <p:extLst>
+      <p:ext uri="{BB962C8B-B14F-4D97-AF65-F5344CB8AC3E}">
+        <p14:creationId xmlns:p14="http://schemas.microsoft.com/office/powerpoint/2010/main" val="609389181"/>
+      </p:ext>
+    </p:extLst>
+  </p:cSld>
+  <p:clrMapOvr>
+    <a:masterClrMapping/>
+  </p:clrMapOvr>
+</p:sld>
+</file>
+
+<file path=ppt/slides/slide13.xml><?xml version="1.0" encoding="utf-8"?>
+<p:sld xmlns:a="http://schemas.openxmlformats.org/drawingml/2006/main" xmlns:r="http://schemas.openxmlformats.org/officeDocument/2006/relationships" xmlns:p="http://schemas.openxmlformats.org/presentationml/2006/main">
+  <p:cSld>
+    <p:spTree>
+      <p:nvGrpSpPr>
+        <p:cNvPr id="1" name=""/>
+        <p:cNvGrpSpPr/>
+        <p:nvPr/>
+      </p:nvGrpSpPr>
+      <p:grpSpPr>
+        <a:xfrm>
+          <a:off x="0" y="0"/>
+          <a:ext cx="0" cy="0"/>
+          <a:chOff x="0" y="0"/>
+          <a:chExt cx="0" cy="0"/>
+        </a:xfrm>
+      </p:grpSpPr>
+      <p:sp>
+        <p:nvSpPr>
+          <p:cNvPr id="3" name="Espace réservé du contenu 2">
+            <a:extLst>
+              <a:ext uri="{FF2B5EF4-FFF2-40B4-BE49-F238E27FC236}">
+                <a16:creationId xmlns:a16="http://schemas.microsoft.com/office/drawing/2014/main" id="{B9FD0C9F-B78A-C85A-3BFC-E222873F9359}"/>
+              </a:ext>
+            </a:extLst>
+          </p:cNvPr>
+          <p:cNvSpPr>
+            <a:spLocks noGrp="1"/>
+          </p:cNvSpPr>
+          <p:nvPr>
+            <p:ph idx="1"/>
+          </p:nvPr>
+        </p:nvSpPr>
+        <p:spPr>
+          <a:xfrm>
+            <a:off x="652486" y="1331844"/>
+            <a:ext cx="4386653" cy="5425136"/>
+          </a:xfrm>
+        </p:spPr>
+        <p:txBody>
+          <a:bodyPr/>
+          <a:lstStyle/>
+          <a:p>
+            <a:pPr marL="0" indent="0">
+              <a:buNone/>
+            </a:pPr>
+            <a:r>
+              <a:rPr lang="fr-FR" dirty="0"/>
+              <a:t>Pour la fonction login:</a:t>
+            </a:r>
+          </a:p>
+          <a:p>
+            <a:pPr marL="0" indent="0">
+              <a:buNone/>
+            </a:pPr>
+            <a:r>
+              <a:rPr lang="fr-FR" dirty="0"/>
+              <a:t>La fonction </a:t>
+            </a:r>
+            <a:r>
+              <a:rPr lang="fr-FR" dirty="0" err="1"/>
+              <a:t>bcrypt.compare</a:t>
+            </a:r>
+            <a:r>
+              <a:rPr lang="fr-FR" dirty="0"/>
+              <a:t> compare la chaîne de caractères entrée par l’utilisateur avec celle stockée dans la base de données. </a:t>
+            </a:r>
+          </a:p>
+          <a:p>
+            <a:pPr marL="0" indent="0">
+              <a:buNone/>
+            </a:pPr>
+            <a:r>
+              <a:rPr lang="fr-FR" dirty="0"/>
+              <a:t>S’il est valide, la fonction </a:t>
+            </a:r>
+            <a:r>
+              <a:rPr lang="fr-FR" dirty="0" err="1"/>
+              <a:t>jwt.sign</a:t>
+            </a:r>
+            <a:r>
+              <a:rPr lang="fr-FR" dirty="0"/>
+              <a:t> va encrypté via un algorithme (ici HS256) l’</a:t>
+            </a:r>
+            <a:r>
+              <a:rPr lang="fr-FR" dirty="0" err="1"/>
+              <a:t>user_id</a:t>
+            </a:r>
+            <a:r>
+              <a:rPr lang="fr-FR" dirty="0"/>
+              <a:t> et le </a:t>
+            </a:r>
+            <a:r>
+              <a:rPr lang="fr-FR" dirty="0" err="1"/>
+              <a:t>role_id</a:t>
+            </a:r>
+            <a:r>
+              <a:rPr lang="fr-FR" dirty="0"/>
+              <a:t> de l’utilisateur dans le </a:t>
+            </a:r>
+            <a:r>
+              <a:rPr lang="fr-FR" dirty="0" err="1"/>
+              <a:t>payload</a:t>
+            </a:r>
+            <a:r>
+              <a:rPr lang="fr-FR" dirty="0"/>
+              <a:t> de notre </a:t>
+            </a:r>
+            <a:r>
+              <a:rPr lang="fr-FR" dirty="0" err="1"/>
+              <a:t>token</a:t>
+            </a:r>
+            <a:r>
+              <a:rPr lang="fr-FR" dirty="0"/>
+              <a:t>. </a:t>
+            </a:r>
+          </a:p>
+          <a:p>
+            <a:pPr marL="0" indent="0">
+              <a:buNone/>
+            </a:pPr>
+            <a:r>
+              <a:rPr lang="fr-FR" dirty="0"/>
+              <a:t>Le </a:t>
+            </a:r>
+            <a:r>
+              <a:rPr lang="fr-FR" dirty="0" err="1"/>
+              <a:t>token</a:t>
+            </a:r>
+            <a:r>
+              <a:rPr lang="fr-FR" dirty="0"/>
+              <a:t> sera lui-même placé dans les cookies.</a:t>
+            </a:r>
+          </a:p>
+        </p:txBody>
+      </p:sp>
+      <p:pic>
+        <p:nvPicPr>
+          <p:cNvPr id="4" name="Image 3">
+            <a:extLst>
+              <a:ext uri="{FF2B5EF4-FFF2-40B4-BE49-F238E27FC236}">
+                <a16:creationId xmlns:a16="http://schemas.microsoft.com/office/drawing/2014/main" id="{C4F2281C-CF1C-BCCD-C3CA-71ADA2DBBF5A}"/>
+              </a:ext>
+            </a:extLst>
+          </p:cNvPr>
+          <p:cNvPicPr>
+            <a:picLocks noChangeAspect="1"/>
+          </p:cNvPicPr>
+          <p:nvPr/>
+        </p:nvPicPr>
+        <p:blipFill>
+          <a:blip r:embed="rId2">
+            <a:extLst>
+              <a:ext uri="{28A0092B-C50C-407E-A947-70E740481C1C}">
+                <a14:useLocalDpi xmlns:a14="http://schemas.microsoft.com/office/drawing/2010/main" val="0"/>
+              </a:ext>
+            </a:extLst>
+          </a:blip>
+          <a:stretch>
+            <a:fillRect/>
+          </a:stretch>
+        </p:blipFill>
+        <p:spPr>
+          <a:xfrm>
+            <a:off x="5933661" y="1272256"/>
+            <a:ext cx="4717878" cy="4313488"/>
+          </a:xfrm>
+          <a:prstGeom prst="rect">
+            <a:avLst/>
+          </a:prstGeom>
+        </p:spPr>
+      </p:pic>
+    </p:spTree>
+    <p:extLst>
+      <p:ext uri="{BB962C8B-B14F-4D97-AF65-F5344CB8AC3E}">
+        <p14:creationId xmlns:p14="http://schemas.microsoft.com/office/powerpoint/2010/main" val="2045044694"/>
+      </p:ext>
+    </p:extLst>
+  </p:cSld>
+  <p:clrMapOvr>
+    <a:masterClrMapping/>
+  </p:clrMapOvr>
+</p:sld>
+</file>
+
+<file path=ppt/slides/slide14.xml><?xml version="1.0" encoding="utf-8"?>
+<p:sld xmlns:a="http://schemas.openxmlformats.org/drawingml/2006/main" xmlns:r="http://schemas.openxmlformats.org/officeDocument/2006/relationships" xmlns:p="http://schemas.openxmlformats.org/presentationml/2006/main">
+  <p:cSld>
+    <p:spTree>
+      <p:nvGrpSpPr>
+        <p:cNvPr id="1" name=""/>
+        <p:cNvGrpSpPr/>
+        <p:nvPr/>
+      </p:nvGrpSpPr>
+      <p:grpSpPr>
+        <a:xfrm>
+          <a:off x="0" y="0"/>
+          <a:ext cx="0" cy="0"/>
+          <a:chOff x="0" y="0"/>
+          <a:chExt cx="0" cy="0"/>
+        </a:xfrm>
+      </p:grpSpPr>
+      <p:sp>
+        <p:nvSpPr>
+          <p:cNvPr id="3" name="Espace réservé du contenu 2">
+            <a:extLst>
+              <a:ext uri="{FF2B5EF4-FFF2-40B4-BE49-F238E27FC236}">
                 <a16:creationId xmlns:a16="http://schemas.microsoft.com/office/drawing/2014/main" id="{43BF261A-73BC-E675-835B-861B83C02238}"/>
               </a:ext>
             </a:extLst>
@@ -6489,7 +6829,7 @@
         </p:nvSpPr>
         <p:spPr>
           <a:xfrm>
-            <a:off x="671583" y="1482306"/>
+            <a:off x="691628" y="1942298"/>
             <a:ext cx="3446092" cy="3893388"/>
           </a:xfrm>
         </p:spPr>
@@ -6543,43 +6883,22 @@
             </a:r>
             <a:r>
               <a:rPr lang="fr-FR" dirty="0"/>
-              <a:t> pour pouvoir envoyer des images.</a:t>
-            </a:r>
-          </a:p>
-          <a:p>
-            <a:pPr marL="0" indent="0">
-              <a:buNone/>
-            </a:pPr>
-            <a:r>
-              <a:rPr lang="fr-FR" dirty="0"/>
-              <a:t>-Pour les likes: </a:t>
-            </a:r>
-          </a:p>
-          <a:p>
-            <a:pPr marL="0" indent="0">
-              <a:buNone/>
-            </a:pPr>
-            <a:r>
-              <a:rPr lang="fr-FR" dirty="0"/>
-              <a:t>Pas de fonction update.</a:t>
-            </a:r>
-          </a:p>
-          <a:p>
-            <a:pPr marL="0" indent="0">
-              <a:buNone/>
-            </a:pPr>
-            <a:r>
-              <a:rPr lang="fr-FR" dirty="0"/>
-              <a:t>Sur la même fonction, on va gérer le .</a:t>
+              <a:t> pour pouvoir envoyer des images (On verra après pour </a:t>
             </a:r>
             <a:r>
               <a:rPr lang="fr-FR" dirty="0" err="1"/>
-              <a:t>Create</a:t>
-            </a:r>
-            <a:r>
-              <a:rPr lang="fr-FR" dirty="0"/>
-              <a:t>, .restore et .destroy en même temps</a:t>
-            </a:r>
+              <a:t>Multer</a:t>
+            </a:r>
+            <a:r>
+              <a:rPr lang="fr-FR" dirty="0"/>
+              <a:t>).</a:t>
+            </a:r>
+          </a:p>
+          <a:p>
+            <a:pPr marL="0" indent="0">
+              <a:buNone/>
+            </a:pPr>
+            <a:endParaRPr lang="fr-FR" dirty="0"/>
           </a:p>
         </p:txBody>
       </p:sp>
@@ -6632,7 +6951,7 @@
 </p:sld>
 </file>
 
-<file path=ppt/slides/slide13.xml><?xml version="1.0" encoding="utf-8"?>
+<file path=ppt/slides/slide15.xml><?xml version="1.0" encoding="utf-8"?>
 <p:sld xmlns:a="http://schemas.openxmlformats.org/drawingml/2006/main" xmlns:r="http://schemas.openxmlformats.org/officeDocument/2006/relationships" xmlns:p="http://schemas.openxmlformats.org/presentationml/2006/main">
   <p:cSld>
     <p:spTree>
@@ -6654,6 +6973,330 @@
           <p:cNvPr id="3" name="Espace réservé du contenu 2">
             <a:extLst>
               <a:ext uri="{FF2B5EF4-FFF2-40B4-BE49-F238E27FC236}">
+                <a16:creationId xmlns:a16="http://schemas.microsoft.com/office/drawing/2014/main" id="{873ED3ED-AAF1-8195-846B-EC39A68080AE}"/>
+              </a:ext>
+            </a:extLst>
+          </p:cNvPr>
+          <p:cNvSpPr>
+            <a:spLocks noGrp="1"/>
+          </p:cNvSpPr>
+          <p:nvPr>
+            <p:ph idx="1"/>
+          </p:nvPr>
+        </p:nvSpPr>
+        <p:spPr>
+          <a:xfrm>
+            <a:off x="713295" y="814452"/>
+            <a:ext cx="3507040" cy="5514588"/>
+          </a:xfrm>
+        </p:spPr>
+        <p:txBody>
+          <a:bodyPr/>
+          <a:lstStyle/>
+          <a:p>
+            <a:pPr marL="0" indent="0">
+              <a:buNone/>
+            </a:pPr>
+            <a:r>
+              <a:rPr lang="fr-FR" dirty="0"/>
+              <a:t>Pour les likes: </a:t>
+            </a:r>
+          </a:p>
+          <a:p>
+            <a:pPr marL="0" indent="0">
+              <a:buNone/>
+            </a:pPr>
+            <a:r>
+              <a:rPr lang="fr-FR" dirty="0"/>
+              <a:t>-On gère dans la même fonction les méthodes restore, destroy et </a:t>
+            </a:r>
+            <a:r>
+              <a:rPr lang="fr-FR" dirty="0" err="1"/>
+              <a:t>create</a:t>
+            </a:r>
+            <a:r>
+              <a:rPr lang="fr-FR" dirty="0"/>
+              <a:t>. On rajoute les conditions si:</a:t>
+            </a:r>
+          </a:p>
+          <a:p>
+            <a:pPr marL="0" indent="0">
+              <a:buNone/>
+            </a:pPr>
+            <a:r>
+              <a:rPr lang="fr-FR" dirty="0"/>
+              <a:t>-le like existe, on appelle la fonction destroy</a:t>
+            </a:r>
+          </a:p>
+          <a:p>
+            <a:pPr marL="0" indent="0">
+              <a:buNone/>
+            </a:pPr>
+            <a:r>
+              <a:rPr lang="fr-FR" dirty="0"/>
+              <a:t>-s’il existe, mais a été supprimé, on appelle la fonction restore.</a:t>
+            </a:r>
+          </a:p>
+          <a:p>
+            <a:pPr marL="0" indent="0">
+              <a:buNone/>
+            </a:pPr>
+            <a:r>
+              <a:rPr lang="fr-FR" dirty="0"/>
+              <a:t>-si le like n’existe pas, on appelle la fonction </a:t>
+            </a:r>
+            <a:r>
+              <a:rPr lang="fr-FR" dirty="0" err="1"/>
+              <a:t>create</a:t>
+            </a:r>
+            <a:r>
+              <a:rPr lang="fr-FR" dirty="0"/>
+              <a:t>.</a:t>
+            </a:r>
+          </a:p>
+          <a:p>
+            <a:pPr marL="0" indent="0">
+              <a:buNone/>
+            </a:pPr>
+            <a:r>
+              <a:rPr lang="fr-FR" dirty="0"/>
+              <a:t>Cela nous permets de gérer l’ajout/suppression de like sur la même route.</a:t>
+            </a:r>
+          </a:p>
+        </p:txBody>
+      </p:sp>
+      <p:pic>
+        <p:nvPicPr>
+          <p:cNvPr id="5" name="Image 4">
+            <a:extLst>
+              <a:ext uri="{FF2B5EF4-FFF2-40B4-BE49-F238E27FC236}">
+                <a16:creationId xmlns:a16="http://schemas.microsoft.com/office/drawing/2014/main" id="{D397F8DB-5010-256A-FA3D-78F9714F08F8}"/>
+              </a:ext>
+            </a:extLst>
+          </p:cNvPr>
+          <p:cNvPicPr>
+            <a:picLocks noChangeAspect="1"/>
+          </p:cNvPicPr>
+          <p:nvPr/>
+        </p:nvPicPr>
+        <p:blipFill>
+          <a:blip r:embed="rId2">
+            <a:extLst>
+              <a:ext uri="{28A0092B-C50C-407E-A947-70E740481C1C}">
+                <a14:useLocalDpi xmlns:a14="http://schemas.microsoft.com/office/drawing/2010/main" val="0"/>
+              </a:ext>
+            </a:extLst>
+          </a:blip>
+          <a:stretch>
+            <a:fillRect/>
+          </a:stretch>
+        </p:blipFill>
+        <p:spPr>
+          <a:xfrm>
+            <a:off x="4535742" y="526775"/>
+            <a:ext cx="5953169" cy="5724567"/>
+          </a:xfrm>
+          <a:prstGeom prst="rect">
+            <a:avLst/>
+          </a:prstGeom>
+        </p:spPr>
+      </p:pic>
+    </p:spTree>
+    <p:extLst>
+      <p:ext uri="{BB962C8B-B14F-4D97-AF65-F5344CB8AC3E}">
+        <p14:creationId xmlns:p14="http://schemas.microsoft.com/office/powerpoint/2010/main" val="436565700"/>
+      </p:ext>
+    </p:extLst>
+  </p:cSld>
+  <p:clrMapOvr>
+    <a:masterClrMapping/>
+  </p:clrMapOvr>
+</p:sld>
+</file>
+
+<file path=ppt/slides/slide16.xml><?xml version="1.0" encoding="utf-8"?>
+<p:sld xmlns:a="http://schemas.openxmlformats.org/drawingml/2006/main" xmlns:r="http://schemas.openxmlformats.org/officeDocument/2006/relationships" xmlns:p="http://schemas.openxmlformats.org/presentationml/2006/main">
+  <p:cSld>
+    <p:spTree>
+      <p:nvGrpSpPr>
+        <p:cNvPr id="1" name=""/>
+        <p:cNvGrpSpPr/>
+        <p:nvPr/>
+      </p:nvGrpSpPr>
+      <p:grpSpPr>
+        <a:xfrm>
+          <a:off x="0" y="0"/>
+          <a:ext cx="0" cy="0"/>
+          <a:chOff x="0" y="0"/>
+          <a:chExt cx="0" cy="0"/>
+        </a:xfrm>
+      </p:grpSpPr>
+      <p:sp>
+        <p:nvSpPr>
+          <p:cNvPr id="3" name="Espace réservé du contenu 2">
+            <a:extLst>
+              <a:ext uri="{FF2B5EF4-FFF2-40B4-BE49-F238E27FC236}">
+                <a16:creationId xmlns:a16="http://schemas.microsoft.com/office/drawing/2014/main" id="{F3DB9435-8E85-C611-3998-AF48761D7742}"/>
+              </a:ext>
+            </a:extLst>
+          </p:cNvPr>
+          <p:cNvSpPr>
+            <a:spLocks noGrp="1"/>
+          </p:cNvSpPr>
+          <p:nvPr>
+            <p:ph idx="1"/>
+          </p:nvPr>
+        </p:nvSpPr>
+        <p:spPr>
+          <a:xfrm>
+            <a:off x="651650" y="2298677"/>
+            <a:ext cx="3894666" cy="5350592"/>
+          </a:xfrm>
+        </p:spPr>
+        <p:txBody>
+          <a:bodyPr/>
+          <a:lstStyle/>
+          <a:p>
+            <a:pPr marL="0" indent="0">
+              <a:buNone/>
+            </a:pPr>
+            <a:r>
+              <a:rPr lang="fr-FR" dirty="0"/>
+              <a:t>Pour les fonctions update et </a:t>
+            </a:r>
+            <a:r>
+              <a:rPr lang="fr-FR" dirty="0" err="1"/>
+              <a:t>delete</a:t>
+            </a:r>
+            <a:r>
+              <a:rPr lang="fr-FR" dirty="0"/>
+              <a:t>, elle auront plus ou moins la même structure peu importe l’entité.</a:t>
+            </a:r>
+          </a:p>
+          <a:p>
+            <a:pPr marL="0" indent="0">
+              <a:buNone/>
+            </a:pPr>
+            <a:endParaRPr lang="fr-FR" dirty="0"/>
+          </a:p>
+          <a:p>
+            <a:pPr marL="0" indent="0">
+              <a:buNone/>
+            </a:pPr>
+            <a:r>
+              <a:rPr lang="fr-FR" dirty="0"/>
+              <a:t>On définira les autorisations dans les middlewares juste après.</a:t>
+            </a:r>
+          </a:p>
+        </p:txBody>
+      </p:sp>
+      <p:pic>
+        <p:nvPicPr>
+          <p:cNvPr id="5" name="Image 4">
+            <a:extLst>
+              <a:ext uri="{FF2B5EF4-FFF2-40B4-BE49-F238E27FC236}">
+                <a16:creationId xmlns:a16="http://schemas.microsoft.com/office/drawing/2014/main" id="{2D01C769-88DF-CAEC-CB8F-C87404065E2C}"/>
+              </a:ext>
+            </a:extLst>
+          </p:cNvPr>
+          <p:cNvPicPr>
+            <a:picLocks noChangeAspect="1"/>
+          </p:cNvPicPr>
+          <p:nvPr/>
+        </p:nvPicPr>
+        <p:blipFill>
+          <a:blip r:embed="rId2">
+            <a:extLst>
+              <a:ext uri="{28A0092B-C50C-407E-A947-70E740481C1C}">
+                <a14:useLocalDpi xmlns:a14="http://schemas.microsoft.com/office/drawing/2010/main" val="0"/>
+              </a:ext>
+            </a:extLst>
+          </a:blip>
+          <a:stretch>
+            <a:fillRect/>
+          </a:stretch>
+        </p:blipFill>
+        <p:spPr>
+          <a:xfrm>
+            <a:off x="4842888" y="481603"/>
+            <a:ext cx="4592162" cy="3468810"/>
+          </a:xfrm>
+          <a:prstGeom prst="rect">
+            <a:avLst/>
+          </a:prstGeom>
+        </p:spPr>
+      </p:pic>
+      <p:pic>
+        <p:nvPicPr>
+          <p:cNvPr id="7" name="Image 6">
+            <a:extLst>
+              <a:ext uri="{FF2B5EF4-FFF2-40B4-BE49-F238E27FC236}">
+                <a16:creationId xmlns:a16="http://schemas.microsoft.com/office/drawing/2014/main" id="{898689E9-3A26-FA38-0330-7C6335BFF5E4}"/>
+              </a:ext>
+            </a:extLst>
+          </p:cNvPr>
+          <p:cNvPicPr>
+            <a:picLocks noChangeAspect="1"/>
+          </p:cNvPicPr>
+          <p:nvPr/>
+        </p:nvPicPr>
+        <p:blipFill>
+          <a:blip r:embed="rId3">
+            <a:extLst>
+              <a:ext uri="{28A0092B-C50C-407E-A947-70E740481C1C}">
+                <a14:useLocalDpi xmlns:a14="http://schemas.microsoft.com/office/drawing/2010/main" val="0"/>
+              </a:ext>
+            </a:extLst>
+          </a:blip>
+          <a:stretch>
+            <a:fillRect/>
+          </a:stretch>
+        </p:blipFill>
+        <p:spPr>
+          <a:xfrm>
+            <a:off x="4801792" y="4344957"/>
+            <a:ext cx="4600998" cy="2231281"/>
+          </a:xfrm>
+          <a:prstGeom prst="rect">
+            <a:avLst/>
+          </a:prstGeom>
+        </p:spPr>
+      </p:pic>
+    </p:spTree>
+    <p:extLst>
+      <p:ext uri="{BB962C8B-B14F-4D97-AF65-F5344CB8AC3E}">
+        <p14:creationId xmlns:p14="http://schemas.microsoft.com/office/powerpoint/2010/main" val="2030644833"/>
+      </p:ext>
+    </p:extLst>
+  </p:cSld>
+  <p:clrMapOvr>
+    <a:masterClrMapping/>
+  </p:clrMapOvr>
+</p:sld>
+</file>
+
+<file path=ppt/slides/slide17.xml><?xml version="1.0" encoding="utf-8"?>
+<p:sld xmlns:a="http://schemas.openxmlformats.org/drawingml/2006/main" xmlns:r="http://schemas.openxmlformats.org/officeDocument/2006/relationships" xmlns:p="http://schemas.openxmlformats.org/presentationml/2006/main">
+  <p:cSld>
+    <p:spTree>
+      <p:nvGrpSpPr>
+        <p:cNvPr id="1" name=""/>
+        <p:cNvGrpSpPr/>
+        <p:nvPr/>
+      </p:nvGrpSpPr>
+      <p:grpSpPr>
+        <a:xfrm>
+          <a:off x="0" y="0"/>
+          <a:ext cx="0" cy="0"/>
+          <a:chOff x="0" y="0"/>
+          <a:chExt cx="0" cy="0"/>
+        </a:xfrm>
+      </p:grpSpPr>
+      <p:sp>
+        <p:nvSpPr>
+          <p:cNvPr id="3" name="Espace réservé du contenu 2">
+            <a:extLst>
+              <a:ext uri="{FF2B5EF4-FFF2-40B4-BE49-F238E27FC236}">
                 <a16:creationId xmlns:a16="http://schemas.microsoft.com/office/drawing/2014/main" id="{7E4D3EC3-3CC2-20E6-CC33-4735150209BC}"/>
               </a:ext>
             </a:extLst>
@@ -6694,19 +7337,49 @@
             </a:r>
             <a:r>
               <a:rPr lang="fr-FR" dirty="0"/>
-              <a:t> avec la fonction </a:t>
+              <a:t> contenu dans les cookies avec la fonction </a:t>
             </a:r>
             <a:r>
               <a:rPr lang="fr-FR" dirty="0" err="1"/>
               <a:t>jwt.verify</a:t>
             </a:r>
-            <a:endParaRPr lang="fr-FR" dirty="0"/>
-          </a:p>
-          <a:p>
-            <a:pPr marL="0" indent="0">
-              <a:buNone/>
-            </a:pPr>
-            <a:endParaRPr lang="fr-FR" dirty="0"/>
+            <a:r>
+              <a:rPr lang="fr-FR" dirty="0"/>
+              <a:t>, bascule le contenu du </a:t>
+            </a:r>
+            <a:r>
+              <a:rPr lang="fr-FR" dirty="0" err="1"/>
+              <a:t>payload</a:t>
+            </a:r>
+            <a:r>
+              <a:rPr lang="fr-FR" dirty="0"/>
+              <a:t> dans le header d’autorisation de la requête.</a:t>
+            </a:r>
+          </a:p>
+          <a:p>
+            <a:pPr marL="0" indent="0">
+              <a:buNone/>
+            </a:pPr>
+            <a:r>
+              <a:rPr lang="fr-FR" dirty="0"/>
+              <a:t>On protège nos header avec </a:t>
+            </a:r>
+            <a:r>
+              <a:rPr lang="fr-FR" dirty="0" err="1"/>
+              <a:t>res.setHeader</a:t>
+            </a:r>
+            <a:r>
+              <a:rPr lang="fr-FR" dirty="0"/>
+              <a:t>(), qu’on peut gérer avec </a:t>
+            </a:r>
+            <a:r>
+              <a:rPr lang="fr-FR" dirty="0" err="1"/>
+              <a:t>helmet</a:t>
+            </a:r>
+            <a:r>
+              <a:rPr lang="fr-FR" dirty="0"/>
+              <a:t>.</a:t>
+            </a:r>
           </a:p>
           <a:p>
             <a:pPr marL="0" indent="0">
@@ -6748,6 +7421,12 @@
               <a:rPr lang="fr-FR" dirty="0"/>
               <a:t> que l’entité sur lequel l’action est effectuée, ou alors si l’utilisateur est un admin.</a:t>
             </a:r>
+          </a:p>
+          <a:p>
+            <a:pPr marL="0" indent="0">
+              <a:buNone/>
+            </a:pPr>
+            <a:endParaRPr lang="fr-FR" dirty="0"/>
           </a:p>
           <a:p>
             <a:pPr marL="0" indent="0">
@@ -6842,7 +7521,7 @@
 </p:sld>
 </file>
 
-<file path=ppt/slides/slide14.xml><?xml version="1.0" encoding="utf-8"?>
+<file path=ppt/slides/slide18.xml><?xml version="1.0" encoding="utf-8"?>
 <p:sld xmlns:a="http://schemas.openxmlformats.org/drawingml/2006/main" xmlns:r="http://schemas.openxmlformats.org/officeDocument/2006/relationships" xmlns:p="http://schemas.openxmlformats.org/presentationml/2006/main">
   <p:cSld>
     <p:spTree>
@@ -6877,7 +7556,7 @@
         </p:nvSpPr>
         <p:spPr>
           <a:xfrm>
-            <a:off x="677334" y="385313"/>
+            <a:off x="657915" y="1145601"/>
             <a:ext cx="3618621" cy="5656049"/>
           </a:xfrm>
         </p:spPr>
@@ -6885,6 +7564,9 @@
           <a:bodyPr/>
           <a:lstStyle/>
           <a:p>
+            <a:pPr marL="0" indent="0">
+              <a:buNone/>
+            </a:pPr>
             <a:r>
               <a:rPr lang="fr-FR" dirty="0"/>
               <a:t>Configuration de </a:t>
@@ -6990,7 +7672,7 @@
 </p:sld>
 </file>
 
-<file path=ppt/slides/slide15.xml><?xml version="1.0" encoding="utf-8"?>
+<file path=ppt/slides/slide19.xml><?xml version="1.0" encoding="utf-8"?>
 <p:sld xmlns:a="http://schemas.openxmlformats.org/drawingml/2006/main" xmlns:r="http://schemas.openxmlformats.org/officeDocument/2006/relationships" xmlns:p="http://schemas.openxmlformats.org/presentationml/2006/main">
   <p:cSld>
     <p:spTree>
@@ -7025,8 +7707,8 @@
         </p:nvSpPr>
         <p:spPr>
           <a:xfrm>
-            <a:off x="654330" y="506083"/>
-            <a:ext cx="4228221" cy="5897589"/>
+            <a:off x="758690" y="917049"/>
+            <a:ext cx="4228221" cy="5609246"/>
           </a:xfrm>
         </p:spPr>
         <p:txBody>
@@ -7035,7 +7717,7 @@
           <a:p>
             <a:r>
               <a:rPr lang="fr-FR" dirty="0"/>
-              <a:t>Etape 7: Mise en place des routes.</a:t>
+              <a:t>Etape 6: Mise en place des routes.</a:t>
             </a:r>
           </a:p>
           <a:p>
@@ -7066,15 +7748,7 @@
             </a:r>
             <a:r>
               <a:rPr lang="fr-FR" dirty="0"/>
-              <a:t> pour autoriser seulement les utilisateurs connectés dans un premiers temps. Et enfin, ils peuvent </a:t>
-            </a:r>
-            <a:r>
-              <a:rPr lang="fr-FR" dirty="0" err="1"/>
-              <a:t>executer</a:t>
-            </a:r>
-            <a:r>
-              <a:rPr lang="fr-FR" dirty="0"/>
-              <a:t> les routes put et </a:t>
+              <a:t> pour autoriser seulement les utilisateurs connectés dans un premiers temps. Et enfin, ils peuvent exécuter les routes put et </a:t>
             </a:r>
             <a:r>
               <a:rPr lang="fr-FR" dirty="0" err="1"/>
@@ -7084,6 +7758,27 @@
               <a:rPr lang="fr-FR" dirty="0"/>
               <a:t> sur toutes les entités s’ils sont admins, ou seulement sur leur propres entités s’ils sont utilisateurs classiques.</a:t>
             </a:r>
+          </a:p>
+          <a:p>
+            <a:pPr marL="0" indent="0">
+              <a:buNone/>
+            </a:pPr>
+            <a:endParaRPr lang="fr-FR" dirty="0"/>
+          </a:p>
+          <a:p>
+            <a:pPr marL="0" indent="0">
+              <a:buNone/>
+            </a:pPr>
+            <a:r>
+              <a:rPr lang="fr-FR" dirty="0"/>
+              <a:t>On applique la même logique avec les autres entités.</a:t>
+            </a:r>
+          </a:p>
+          <a:p>
+            <a:pPr marL="0" indent="0">
+              <a:buNone/>
+            </a:pPr>
+            <a:endParaRPr lang="fr-FR" dirty="0"/>
           </a:p>
         </p:txBody>
       </p:sp>
@@ -7172,7 +7867,7 @@
 </p:sld>
 </file>
 
-<file path=ppt/slides/slide16.xml><?xml version="1.0" encoding="utf-8"?>
+<file path=ppt/slides/slide2.xml><?xml version="1.0" encoding="utf-8"?>
 <p:sld xmlns:a="http://schemas.openxmlformats.org/drawingml/2006/main" xmlns:r="http://schemas.openxmlformats.org/officeDocument/2006/relationships" xmlns:p="http://schemas.openxmlformats.org/presentationml/2006/main">
   <p:cSld>
     <p:spTree>
@@ -7191,6 +7886,159 @@
       </p:grpSpPr>
       <p:sp>
         <p:nvSpPr>
+          <p:cNvPr id="2" name="Titre 1">
+            <a:extLst>
+              <a:ext uri="{FF2B5EF4-FFF2-40B4-BE49-F238E27FC236}">
+                <a16:creationId xmlns:a16="http://schemas.microsoft.com/office/drawing/2014/main" id="{5B8DC0A3-2973-6956-BF3A-8CE8EA783798}"/>
+              </a:ext>
+            </a:extLst>
+          </p:cNvPr>
+          <p:cNvSpPr>
+            <a:spLocks noGrp="1"/>
+          </p:cNvSpPr>
+          <p:nvPr>
+            <p:ph type="title"/>
+          </p:nvPr>
+        </p:nvSpPr>
+        <p:spPr/>
+        <p:txBody>
+          <a:bodyPr/>
+          <a:lstStyle/>
+          <a:p>
+            <a:r>
+              <a:rPr lang="fr-FR" dirty="0"/>
+              <a:t>Cahier des charges</a:t>
+            </a:r>
+          </a:p>
+        </p:txBody>
+      </p:sp>
+      <p:sp>
+        <p:nvSpPr>
+          <p:cNvPr id="3" name="Espace réservé du contenu 2">
+            <a:extLst>
+              <a:ext uri="{FF2B5EF4-FFF2-40B4-BE49-F238E27FC236}">
+                <a16:creationId xmlns:a16="http://schemas.microsoft.com/office/drawing/2014/main" id="{D0C9AE63-805B-E50D-CDF5-1F3846ED2CBE}"/>
+              </a:ext>
+            </a:extLst>
+          </p:cNvPr>
+          <p:cNvSpPr>
+            <a:spLocks noGrp="1"/>
+          </p:cNvSpPr>
+          <p:nvPr>
+            <p:ph idx="1"/>
+          </p:nvPr>
+        </p:nvSpPr>
+        <p:spPr/>
+        <p:txBody>
+          <a:bodyPr/>
+          <a:lstStyle/>
+          <a:p>
+            <a:r>
+              <a:rPr lang="fr-FR" dirty="0"/>
+              <a:t>Créer un site internet de type réseau social. </a:t>
+            </a:r>
+            <a:br>
+              <a:rPr lang="fr-FR" dirty="0"/>
+            </a:br>
+            <a:r>
+              <a:rPr lang="fr-FR" dirty="0"/>
+              <a:t>L’utilisateur doit pouvoir:</a:t>
+            </a:r>
+          </a:p>
+          <a:p>
+            <a:pPr marL="0" indent="0">
+              <a:buNone/>
+            </a:pPr>
+            <a:r>
+              <a:rPr lang="fr-FR" dirty="0"/>
+              <a:t>-Créer un compte et se connecter.</a:t>
+            </a:r>
+          </a:p>
+          <a:p>
+            <a:pPr marL="0" indent="0">
+              <a:buNone/>
+            </a:pPr>
+            <a:r>
+              <a:rPr lang="fr-FR" dirty="0"/>
+              <a:t>-Pouvoir accéder à la page d’accueil et voir les autres </a:t>
+            </a:r>
+            <a:r>
+              <a:rPr lang="fr-FR" dirty="0" err="1"/>
+              <a:t>posts</a:t>
+            </a:r>
+            <a:r>
+              <a:rPr lang="fr-FR" dirty="0"/>
+              <a:t> et commentaires. Sans </a:t>
+            </a:r>
+            <a:r>
+              <a:rPr lang="fr-FR" dirty="0" err="1"/>
+              <a:t>nécéssairement</a:t>
+            </a:r>
+            <a:r>
+              <a:rPr lang="fr-FR" dirty="0"/>
+              <a:t> être connecté.</a:t>
+            </a:r>
+          </a:p>
+          <a:p>
+            <a:pPr marL="0" indent="0">
+              <a:buNone/>
+            </a:pPr>
+            <a:r>
+              <a:rPr lang="fr-FR" dirty="0"/>
+              <a:t>-Une fois connecté, l’utilisateur peut poster des </a:t>
+            </a:r>
+            <a:r>
+              <a:rPr lang="fr-FR" dirty="0" err="1"/>
+              <a:t>posts</a:t>
+            </a:r>
+            <a:r>
+              <a:rPr lang="fr-FR" dirty="0"/>
+              <a:t>, commentaires et likes. Il peut aussi modifier ou supprimer uniquement ce qu’il a crée.</a:t>
+            </a:r>
+          </a:p>
+          <a:p>
+            <a:pPr marL="0" indent="0">
+              <a:buNone/>
+            </a:pPr>
+            <a:r>
+              <a:rPr lang="fr-FR" dirty="0"/>
+              <a:t>Il faut également un rôle administrateur pour la modération, qui aura tout les droits sur notre site.</a:t>
+            </a:r>
+          </a:p>
+        </p:txBody>
+      </p:sp>
+    </p:spTree>
+    <p:extLst>
+      <p:ext uri="{BB962C8B-B14F-4D97-AF65-F5344CB8AC3E}">
+        <p14:creationId xmlns:p14="http://schemas.microsoft.com/office/powerpoint/2010/main" val="1700495610"/>
+      </p:ext>
+    </p:extLst>
+  </p:cSld>
+  <p:clrMapOvr>
+    <a:masterClrMapping/>
+  </p:clrMapOvr>
+</p:sld>
+</file>
+
+<file path=ppt/slides/slide20.xml><?xml version="1.0" encoding="utf-8"?>
+<p:sld xmlns:a="http://schemas.openxmlformats.org/drawingml/2006/main" xmlns:r="http://schemas.openxmlformats.org/officeDocument/2006/relationships" xmlns:p="http://schemas.openxmlformats.org/presentationml/2006/main">
+  <p:cSld>
+    <p:spTree>
+      <p:nvGrpSpPr>
+        <p:cNvPr id="1" name=""/>
+        <p:cNvGrpSpPr/>
+        <p:nvPr/>
+      </p:nvGrpSpPr>
+      <p:grpSpPr>
+        <a:xfrm>
+          <a:off x="0" y="0"/>
+          <a:ext cx="0" cy="0"/>
+          <a:chOff x="0" y="0"/>
+          <a:chExt cx="0" cy="0"/>
+        </a:xfrm>
+      </p:grpSpPr>
+      <p:sp>
+        <p:nvSpPr>
           <p:cNvPr id="3" name="Espace réservé du contenu 2">
             <a:extLst>
               <a:ext uri="{FF2B5EF4-FFF2-40B4-BE49-F238E27FC236}">
@@ -7217,7 +8065,7 @@
           <a:p>
             <a:r>
               <a:rPr lang="fr-FR" dirty="0"/>
-              <a:t>Etape 8: import de nos routes et extensions dans l’app</a:t>
+              <a:t>Etape 7: import de nos routes et extensions dans l’app</a:t>
             </a:r>
           </a:p>
         </p:txBody>
@@ -7271,7 +8119,7 @@
 </p:sld>
 </file>
 
-<file path=ppt/slides/slide17.xml><?xml version="1.0" encoding="utf-8"?>
+<file path=ppt/slides/slide21.xml><?xml version="1.0" encoding="utf-8"?>
 <p:sld xmlns:a="http://schemas.openxmlformats.org/drawingml/2006/main" xmlns:r="http://schemas.openxmlformats.org/officeDocument/2006/relationships" xmlns:p="http://schemas.openxmlformats.org/presentationml/2006/main">
   <p:cSld>
     <p:spTree>
@@ -7316,7 +8164,7 @@
           <a:p>
             <a:r>
               <a:rPr lang="fr-FR" dirty="0"/>
-              <a:t>Etape 9: Tests avec </a:t>
+              <a:t>Etape 8:Tests avec </a:t>
             </a:r>
             <a:r>
               <a:rPr lang="fr-FR" dirty="0" err="1"/>
@@ -7379,15 +8227,7 @@
             </a:pPr>
             <a:r>
               <a:rPr lang="fr-FR" dirty="0"/>
-              <a:t>IMPORTANT! On </a:t>
-            </a:r>
-            <a:r>
-              <a:rPr lang="fr-FR" dirty="0" err="1"/>
-              <a:t>éxecute</a:t>
-            </a:r>
-            <a:r>
-              <a:rPr lang="fr-FR" dirty="0"/>
-              <a:t> les tests sur notre base de données test.</a:t>
+              <a:t>IMPORTANT! On exécute les tests sur notre base de données test.</a:t>
             </a:r>
           </a:p>
         </p:txBody>
@@ -7441,7 +8281,7 @@
 </p:sld>
 </file>
 
-<file path=ppt/slides/slide18.xml><?xml version="1.0" encoding="utf-8"?>
+<file path=ppt/slides/slide22.xml><?xml version="1.0" encoding="utf-8"?>
 <p:sld xmlns:a="http://schemas.openxmlformats.org/drawingml/2006/main" xmlns:r="http://schemas.openxmlformats.org/officeDocument/2006/relationships" xmlns:p="http://schemas.openxmlformats.org/presentationml/2006/main">
   <p:cSld>
     <p:spTree>
@@ -7476,7 +8316,7 @@
         </p:nvSpPr>
         <p:spPr>
           <a:xfrm>
-            <a:off x="677334" y="644107"/>
+            <a:off x="708157" y="966158"/>
             <a:ext cx="4297232" cy="5397256"/>
           </a:xfrm>
         </p:spPr>
@@ -7615,7 +8455,7 @@
         </p:blipFill>
         <p:spPr>
           <a:xfrm>
-            <a:off x="6038464" y="966158"/>
+            <a:off x="5622361" y="1043214"/>
             <a:ext cx="5093564" cy="4370650"/>
           </a:xfrm>
           <a:prstGeom prst="rect">
@@ -7636,7 +8476,7 @@
 </p:sld>
 </file>
 
-<file path=ppt/slides/slide19.xml><?xml version="1.0" encoding="utf-8"?>
+<file path=ppt/slides/slide23.xml><?xml version="1.0" encoding="utf-8"?>
 <p:sld xmlns:a="http://schemas.openxmlformats.org/drawingml/2006/main" xmlns:r="http://schemas.openxmlformats.org/officeDocument/2006/relationships" xmlns:p="http://schemas.openxmlformats.org/presentationml/2006/main">
   <p:cSld>
     <p:spTree>
@@ -7658,6 +8498,207 @@
           <p:cNvPr id="3" name="Espace réservé du contenu 2">
             <a:extLst>
               <a:ext uri="{FF2B5EF4-FFF2-40B4-BE49-F238E27FC236}">
+                <a16:creationId xmlns:a16="http://schemas.microsoft.com/office/drawing/2014/main" id="{4723DA65-9E02-DE93-DB45-D004B8ED7197}"/>
+              </a:ext>
+            </a:extLst>
+          </p:cNvPr>
+          <p:cNvSpPr>
+            <a:spLocks noGrp="1"/>
+          </p:cNvSpPr>
+          <p:nvPr>
+            <p:ph idx="1"/>
+          </p:nvPr>
+        </p:nvSpPr>
+        <p:spPr>
+          <a:xfrm>
+            <a:off x="841721" y="1749330"/>
+            <a:ext cx="4073570" cy="5236292"/>
+          </a:xfrm>
+        </p:spPr>
+        <p:txBody>
+          <a:bodyPr/>
+          <a:lstStyle/>
+          <a:p>
+            <a:pPr marL="0" indent="0">
+              <a:buNone/>
+            </a:pPr>
+            <a:r>
+              <a:rPr lang="fr-FR" dirty="0"/>
+              <a:t>Pour les fonctions qui passent pas les middlewares </a:t>
+            </a:r>
+            <a:r>
+              <a:rPr lang="fr-FR" dirty="0" err="1"/>
+              <a:t>auth</a:t>
+            </a:r>
+            <a:r>
+              <a:rPr lang="fr-FR" dirty="0"/>
+              <a:t> et checks, on simule la fonction </a:t>
+            </a:r>
+            <a:r>
+              <a:rPr lang="fr-FR" dirty="0" err="1"/>
+              <a:t>jwt.verify</a:t>
+            </a:r>
+            <a:endParaRPr lang="fr-FR" dirty="0"/>
+          </a:p>
+          <a:p>
+            <a:pPr marL="0" indent="0">
+              <a:buNone/>
+            </a:pPr>
+            <a:r>
+              <a:rPr lang="fr-FR" dirty="0"/>
+              <a:t>Cela nous permets de simuler le contenu de notre </a:t>
+            </a:r>
+            <a:r>
+              <a:rPr lang="fr-FR" dirty="0" err="1"/>
+              <a:t>token</a:t>
+            </a:r>
+            <a:r>
+              <a:rPr lang="fr-FR" dirty="0"/>
+              <a:t> avec l’</a:t>
+            </a:r>
+            <a:r>
+              <a:rPr lang="fr-FR" dirty="0" err="1"/>
+              <a:t>user_id</a:t>
+            </a:r>
+            <a:r>
+              <a:rPr lang="fr-FR" dirty="0"/>
+              <a:t> et </a:t>
+            </a:r>
+            <a:r>
+              <a:rPr lang="fr-FR" dirty="0" err="1"/>
+              <a:t>role_id</a:t>
+            </a:r>
+            <a:r>
+              <a:rPr lang="fr-FR" dirty="0"/>
+              <a:t> de notre choix.</a:t>
+            </a:r>
+          </a:p>
+          <a:p>
+            <a:pPr marL="0" indent="0">
+              <a:buNone/>
+            </a:pPr>
+            <a:r>
+              <a:rPr lang="fr-FR" dirty="0"/>
+              <a:t>On simule la présence de notre </a:t>
+            </a:r>
+            <a:r>
+              <a:rPr lang="fr-FR" dirty="0" err="1"/>
+              <a:t>token</a:t>
+            </a:r>
+            <a:r>
+              <a:rPr lang="fr-FR" dirty="0"/>
+              <a:t> valide dans les cookies lors de la requête.</a:t>
+            </a:r>
+          </a:p>
+        </p:txBody>
+      </p:sp>
+      <p:pic>
+        <p:nvPicPr>
+          <p:cNvPr id="5" name="Image 4">
+            <a:extLst>
+              <a:ext uri="{FF2B5EF4-FFF2-40B4-BE49-F238E27FC236}">
+                <a16:creationId xmlns:a16="http://schemas.microsoft.com/office/drawing/2014/main" id="{35AEC15F-2CB4-067D-3696-19674A0646CD}"/>
+              </a:ext>
+            </a:extLst>
+          </p:cNvPr>
+          <p:cNvPicPr>
+            <a:picLocks noChangeAspect="1"/>
+          </p:cNvPicPr>
+          <p:nvPr/>
+        </p:nvPicPr>
+        <p:blipFill>
+          <a:blip r:embed="rId2">
+            <a:extLst>
+              <a:ext uri="{28A0092B-C50C-407E-A947-70E740481C1C}">
+                <a14:useLocalDpi xmlns:a14="http://schemas.microsoft.com/office/drawing/2010/main" val="0"/>
+              </a:ext>
+            </a:extLst>
+          </a:blip>
+          <a:stretch>
+            <a:fillRect/>
+          </a:stretch>
+        </p:blipFill>
+        <p:spPr>
+          <a:xfrm>
+            <a:off x="5253217" y="256595"/>
+            <a:ext cx="4146846" cy="3833358"/>
+          </a:xfrm>
+          <a:prstGeom prst="rect">
+            <a:avLst/>
+          </a:prstGeom>
+        </p:spPr>
+      </p:pic>
+      <p:pic>
+        <p:nvPicPr>
+          <p:cNvPr id="7" name="Image 6">
+            <a:extLst>
+              <a:ext uri="{FF2B5EF4-FFF2-40B4-BE49-F238E27FC236}">
+                <a16:creationId xmlns:a16="http://schemas.microsoft.com/office/drawing/2014/main" id="{0848E1AE-1C25-538E-98DC-8662F03E7E22}"/>
+              </a:ext>
+            </a:extLst>
+          </p:cNvPr>
+          <p:cNvPicPr>
+            <a:picLocks noChangeAspect="1"/>
+          </p:cNvPicPr>
+          <p:nvPr/>
+        </p:nvPicPr>
+        <p:blipFill>
+          <a:blip r:embed="rId3">
+            <a:extLst>
+              <a:ext uri="{28A0092B-C50C-407E-A947-70E740481C1C}">
+                <a14:useLocalDpi xmlns:a14="http://schemas.microsoft.com/office/drawing/2010/main" val="0"/>
+              </a:ext>
+            </a:extLst>
+          </a:blip>
+          <a:stretch>
+            <a:fillRect/>
+          </a:stretch>
+        </p:blipFill>
+        <p:spPr>
+          <a:xfrm>
+            <a:off x="5253217" y="4367476"/>
+            <a:ext cx="4146846" cy="1885489"/>
+          </a:xfrm>
+          <a:prstGeom prst="rect">
+            <a:avLst/>
+          </a:prstGeom>
+        </p:spPr>
+      </p:pic>
+    </p:spTree>
+    <p:extLst>
+      <p:ext uri="{BB962C8B-B14F-4D97-AF65-F5344CB8AC3E}">
+        <p14:creationId xmlns:p14="http://schemas.microsoft.com/office/powerpoint/2010/main" val="119371051"/>
+      </p:ext>
+    </p:extLst>
+  </p:cSld>
+  <p:clrMapOvr>
+    <a:masterClrMapping/>
+  </p:clrMapOvr>
+</p:sld>
+</file>
+
+<file path=ppt/slides/slide24.xml><?xml version="1.0" encoding="utf-8"?>
+<p:sld xmlns:a="http://schemas.openxmlformats.org/drawingml/2006/main" xmlns:r="http://schemas.openxmlformats.org/officeDocument/2006/relationships" xmlns:p="http://schemas.openxmlformats.org/presentationml/2006/main">
+  <p:cSld>
+    <p:spTree>
+      <p:nvGrpSpPr>
+        <p:cNvPr id="1" name=""/>
+        <p:cNvGrpSpPr/>
+        <p:nvPr/>
+      </p:nvGrpSpPr>
+      <p:grpSpPr>
+        <a:xfrm>
+          <a:off x="0" y="0"/>
+          <a:ext cx="0" cy="0"/>
+          <a:chOff x="0" y="0"/>
+          <a:chExt cx="0" cy="0"/>
+        </a:xfrm>
+      </p:grpSpPr>
+      <p:sp>
+        <p:nvSpPr>
+          <p:cNvPr id="3" name="Espace réservé du contenu 2">
+            <a:extLst>
+              <a:ext uri="{FF2B5EF4-FFF2-40B4-BE49-F238E27FC236}">
                 <a16:creationId xmlns:a16="http://schemas.microsoft.com/office/drawing/2014/main" id="{B0568855-7E58-AC43-AFEF-CE0A40F2E5D0}"/>
               </a:ext>
             </a:extLst>
@@ -7671,7 +8712,7 @@
         </p:nvSpPr>
         <p:spPr>
           <a:xfrm>
-            <a:off x="677334" y="592347"/>
+            <a:off x="723568" y="777282"/>
             <a:ext cx="4625036" cy="5449015"/>
           </a:xfrm>
         </p:spPr>
@@ -7681,7 +8722,7 @@
           <a:p>
             <a:r>
               <a:rPr lang="fr-FR" dirty="0"/>
-              <a:t>Etape 10: Phase de tests externes dans Postman.</a:t>
+              <a:t>Etape 9: Phase de tests externes dans Postman.</a:t>
             </a:r>
           </a:p>
           <a:p>
@@ -7716,7 +8757,10 @@
               <a:rPr lang="fr-FR" dirty="0" err="1"/>
               <a:t>token</a:t>
             </a:r>
-            <a:endParaRPr lang="fr-FR" dirty="0"/>
+            <a:r>
+              <a:rPr lang="fr-FR" dirty="0"/>
+              <a:t> dans les cookies.</a:t>
+            </a:r>
           </a:p>
           <a:p>
             <a:pPr marL="0" indent="0">
@@ -7794,7 +8838,7 @@
 </p:sld>
 </file>
 
-<file path=ppt/slides/slide2.xml><?xml version="1.0" encoding="utf-8"?>
+<file path=ppt/slides/slide25.xml><?xml version="1.0" encoding="utf-8"?>
 <p:sld xmlns:a="http://schemas.openxmlformats.org/drawingml/2006/main" xmlns:r="http://schemas.openxmlformats.org/officeDocument/2006/relationships" xmlns:p="http://schemas.openxmlformats.org/presentationml/2006/main">
   <p:cSld>
     <p:spTree>
@@ -7816,7 +8860,7 @@
           <p:cNvPr id="2" name="Titre 1">
             <a:extLst>
               <a:ext uri="{FF2B5EF4-FFF2-40B4-BE49-F238E27FC236}">
-                <a16:creationId xmlns:a16="http://schemas.microsoft.com/office/drawing/2014/main" id="{5B8DC0A3-2973-6956-BF3A-8CE8EA783798}"/>
+                <a16:creationId xmlns:a16="http://schemas.microsoft.com/office/drawing/2014/main" id="{05FF8A51-E253-BDF0-9392-70C8A4FA9D93}"/>
               </a:ext>
             </a:extLst>
           </p:cNvPr>
@@ -7834,7 +8878,7 @@
           <a:p>
             <a:r>
               <a:rPr lang="fr-FR" dirty="0"/>
-              <a:t>Cahier des charges</a:t>
+              <a:t>Frontend</a:t>
             </a:r>
           </a:p>
         </p:txBody>
@@ -7844,7 +8888,7 @@
           <p:cNvPr id="3" name="Espace réservé du contenu 2">
             <a:extLst>
               <a:ext uri="{FF2B5EF4-FFF2-40B4-BE49-F238E27FC236}">
-                <a16:creationId xmlns:a16="http://schemas.microsoft.com/office/drawing/2014/main" id="{D0C9AE63-805B-E50D-CDF5-1F3846ED2CBE}"/>
+                <a16:creationId xmlns:a16="http://schemas.microsoft.com/office/drawing/2014/main" id="{7D6749BC-E27D-BD38-5277-13BDFB84D04D}"/>
               </a:ext>
             </a:extLst>
           </p:cNvPr>
@@ -7855,89 +8899,137 @@
             <p:ph idx="1"/>
           </p:nvPr>
         </p:nvSpPr>
-        <p:spPr/>
+        <p:spPr>
+          <a:xfrm>
+            <a:off x="677333" y="2160589"/>
+            <a:ext cx="8159689" cy="3880773"/>
+          </a:xfrm>
+        </p:spPr>
         <p:txBody>
           <a:bodyPr/>
           <a:lstStyle/>
           <a:p>
             <a:r>
               <a:rPr lang="fr-FR" dirty="0"/>
-              <a:t>Créer un site internet de type réseau social. </a:t>
-            </a:r>
-            <a:br>
-              <a:rPr lang="fr-FR" dirty="0"/>
-            </a:br>
-            <a:r>
-              <a:rPr lang="fr-FR" dirty="0"/>
-              <a:t>L’utilisateur doit pouvoir:</a:t>
-            </a:r>
-          </a:p>
-          <a:p>
-            <a:pPr marL="0" indent="0">
-              <a:buNone/>
-            </a:pPr>
-            <a:r>
-              <a:rPr lang="fr-FR" dirty="0"/>
-              <a:t>-Créer un compte et se connecter.</a:t>
-            </a:r>
-          </a:p>
-          <a:p>
-            <a:pPr marL="0" indent="0">
-              <a:buNone/>
-            </a:pPr>
-            <a:r>
-              <a:rPr lang="fr-FR" dirty="0"/>
-              <a:t>-Pouvoir accéder à la page d’accueil et voir les autres </a:t>
+              <a:t>Choix de bibliothèque: </a:t>
             </a:r>
             <a:r>
               <a:rPr lang="fr-FR" dirty="0" err="1"/>
-              <a:t>posts</a:t>
-            </a:r>
-            <a:r>
-              <a:rPr lang="fr-FR" dirty="0"/>
-              <a:t> et commentaires. Sans </a:t>
+              <a:t>React</a:t>
+            </a:r>
+            <a:r>
+              <a:rPr lang="fr-FR" dirty="0"/>
+              <a:t> avec pour serveur de développement local Vite.js</a:t>
+            </a:r>
+          </a:p>
+          <a:p>
+            <a:pPr marL="0" indent="0">
+              <a:buNone/>
+            </a:pPr>
+            <a:endParaRPr lang="fr-FR" dirty="0"/>
+          </a:p>
+          <a:p>
+            <a:pPr marL="0" indent="0">
+              <a:buNone/>
+            </a:pPr>
+            <a:r>
+              <a:rPr lang="fr-FR" dirty="0"/>
+              <a:t>Installation de </a:t>
             </a:r>
             <a:r>
               <a:rPr lang="fr-FR" dirty="0" err="1"/>
-              <a:t>nécéssairement</a:t>
-            </a:r>
-            <a:r>
-              <a:rPr lang="fr-FR" dirty="0"/>
-              <a:t> être connecté.</a:t>
-            </a:r>
-          </a:p>
-          <a:p>
-            <a:pPr marL="0" indent="0">
-              <a:buNone/>
-            </a:pPr>
-            <a:r>
-              <a:rPr lang="fr-FR" dirty="0"/>
-              <a:t>-Une fois connecté, l’utilisateur peut poster des </a:t>
+              <a:t>concurrently</a:t>
+            </a:r>
+            <a:r>
+              <a:rPr lang="fr-FR" dirty="0"/>
+              <a:t> pour faire tourner le front et le back </a:t>
             </a:r>
             <a:r>
               <a:rPr lang="fr-FR" dirty="0" err="1"/>
-              <a:t>posts</a:t>
-            </a:r>
-            <a:r>
-              <a:rPr lang="fr-FR" dirty="0"/>
-              <a:t>, commentaires et likes. Il peut aussi modifier ou supprimer uniquement ce qu’il a crée.</a:t>
-            </a:r>
-          </a:p>
-          <a:p>
-            <a:pPr marL="0" indent="0">
-              <a:buNone/>
-            </a:pPr>
-            <a:r>
-              <a:rPr lang="fr-FR" dirty="0"/>
-              <a:t>Il faut également un rôle administrateur pour la modération, qui aura tout les droits sur notre site.</a:t>
-            </a:r>
+              <a:t>simultanèment</a:t>
+            </a:r>
+            <a:r>
+              <a:rPr lang="fr-FR" dirty="0"/>
+              <a:t>.</a:t>
+            </a:r>
+          </a:p>
+          <a:p>
+            <a:pPr marL="0" indent="0">
+              <a:buNone/>
+            </a:pPr>
+            <a:r>
+              <a:rPr lang="fr-FR" dirty="0"/>
+              <a:t>Structuration du projet:</a:t>
+            </a:r>
+          </a:p>
+          <a:p>
+            <a:pPr marL="0" indent="0">
+              <a:buNone/>
+            </a:pPr>
+            <a:r>
+              <a:rPr lang="fr-FR" dirty="0"/>
+              <a:t>-Séparation des pages et des composants:</a:t>
+            </a:r>
+          </a:p>
+          <a:p>
+            <a:pPr marL="0" indent="0">
+              <a:buNone/>
+            </a:pPr>
+            <a:r>
+              <a:rPr lang="fr-FR" dirty="0"/>
+              <a:t>-Pages: </a:t>
+            </a:r>
+            <a:r>
+              <a:rPr lang="fr-FR" dirty="0" err="1"/>
+              <a:t>HomePage</a:t>
+            </a:r>
+            <a:r>
+              <a:rPr lang="fr-FR" dirty="0"/>
+              <a:t>, </a:t>
+            </a:r>
+            <a:r>
+              <a:rPr lang="fr-FR" dirty="0" err="1"/>
+              <a:t>Signup</a:t>
+            </a:r>
+            <a:r>
+              <a:rPr lang="fr-FR" dirty="0"/>
+              <a:t> et Login</a:t>
+            </a:r>
+          </a:p>
+          <a:p>
+            <a:pPr marL="0" indent="0">
+              <a:buNone/>
+            </a:pPr>
+            <a:r>
+              <a:rPr lang="fr-FR" dirty="0"/>
+              <a:t>-Composants: Header, </a:t>
+            </a:r>
+            <a:r>
+              <a:rPr lang="fr-FR" dirty="0" err="1"/>
+              <a:t>Footer</a:t>
+            </a:r>
+            <a:r>
+              <a:rPr lang="fr-FR" dirty="0"/>
+              <a:t>, </a:t>
+            </a:r>
+            <a:r>
+              <a:rPr lang="fr-FR" dirty="0" err="1"/>
+              <a:t>CreatePost</a:t>
+            </a:r>
+            <a:r>
+              <a:rPr lang="fr-FR" dirty="0"/>
+              <a:t>, ensuite nos fonctions de gestion des commentaires et likes.</a:t>
+            </a:r>
+          </a:p>
+          <a:p>
+            <a:endParaRPr lang="fr-FR" dirty="0"/>
           </a:p>
         </p:txBody>
       </p:sp>
     </p:spTree>
     <p:extLst>
       <p:ext uri="{BB962C8B-B14F-4D97-AF65-F5344CB8AC3E}">
-        <p14:creationId xmlns:p14="http://schemas.microsoft.com/office/powerpoint/2010/main" val="1700495610"/>
+        <p14:creationId xmlns:p14="http://schemas.microsoft.com/office/powerpoint/2010/main" val="1277928900"/>
       </p:ext>
     </p:extLst>
   </p:cSld>
@@ -7947,7 +9039,7 @@
 </p:sld>
 </file>
 
-<file path=ppt/slides/slide20.xml><?xml version="1.0" encoding="utf-8"?>
+<file path=ppt/slides/slide26.xml><?xml version="1.0" encoding="utf-8"?>
 <p:sld xmlns:a="http://schemas.openxmlformats.org/drawingml/2006/main" xmlns:r="http://schemas.openxmlformats.org/officeDocument/2006/relationships" xmlns:p="http://schemas.openxmlformats.org/presentationml/2006/main">
   <p:cSld>
     <p:spTree>
@@ -7966,10 +9058,10 @@
       </p:grpSpPr>
       <p:sp>
         <p:nvSpPr>
-          <p:cNvPr id="2" name="Titre 1">
+          <p:cNvPr id="3" name="Espace réservé du contenu 2">
             <a:extLst>
               <a:ext uri="{FF2B5EF4-FFF2-40B4-BE49-F238E27FC236}">
-                <a16:creationId xmlns:a16="http://schemas.microsoft.com/office/drawing/2014/main" id="{05FF8A51-E253-BDF0-9392-70C8A4FA9D93}"/>
+                <a16:creationId xmlns:a16="http://schemas.microsoft.com/office/drawing/2014/main" id="{75AAB8BF-DF66-A1AF-120B-CA158E10B433}"/>
               </a:ext>
             </a:extLst>
           </p:cNvPr>
@@ -7977,68 +9069,27 @@
             <a:spLocks noGrp="1"/>
           </p:cNvSpPr>
           <p:nvPr>
-            <p:ph type="title"/>
-          </p:nvPr>
-        </p:nvSpPr>
-        <p:spPr/>
+            <p:ph idx="1"/>
+          </p:nvPr>
+        </p:nvSpPr>
+        <p:spPr>
+          <a:xfrm>
+            <a:off x="677334" y="606287"/>
+            <a:ext cx="8596668" cy="5435075"/>
+          </a:xfrm>
+        </p:spPr>
         <p:txBody>
           <a:bodyPr/>
           <a:lstStyle/>
           <a:p>
-            <a:r>
-              <a:rPr lang="fr-FR" dirty="0"/>
-              <a:t>Frontend</a:t>
-            </a:r>
-          </a:p>
-        </p:txBody>
-      </p:sp>
-      <p:sp>
-        <p:nvSpPr>
-          <p:cNvPr id="3" name="Espace réservé du contenu 2">
-            <a:extLst>
-              <a:ext uri="{FF2B5EF4-FFF2-40B4-BE49-F238E27FC236}">
-                <a16:creationId xmlns:a16="http://schemas.microsoft.com/office/drawing/2014/main" id="{7D6749BC-E27D-BD38-5277-13BDFB84D04D}"/>
-              </a:ext>
-            </a:extLst>
-          </p:cNvPr>
-          <p:cNvSpPr>
-            <a:spLocks noGrp="1"/>
-          </p:cNvSpPr>
-          <p:nvPr>
-            <p:ph idx="1"/>
-          </p:nvPr>
-        </p:nvSpPr>
-        <p:spPr/>
-        <p:txBody>
-          <a:bodyPr/>
-          <a:lstStyle/>
-          <a:p>
-            <a:r>
-              <a:rPr lang="fr-FR" dirty="0"/>
-              <a:t>Choix de bibliothèque: </a:t>
-            </a:r>
-            <a:r>
-              <a:rPr lang="fr-FR" dirty="0" err="1"/>
-              <a:t>React</a:t>
-            </a:r>
-            <a:r>
-              <a:rPr lang="fr-FR" dirty="0"/>
-              <a:t> avec pour serveur de développement local Vite</a:t>
-            </a:r>
-            <a:r>
-              <a:rPr lang="fr-FR"/>
-              <a:t>.js</a:t>
-            </a:r>
-          </a:p>
-          <a:p>
-            <a:endParaRPr lang="fr-FR" dirty="0"/>
+            <a:endParaRPr lang="fr-FR"/>
           </a:p>
         </p:txBody>
       </p:sp>
     </p:spTree>
     <p:extLst>
       <p:ext uri="{BB962C8B-B14F-4D97-AF65-F5344CB8AC3E}">
-        <p14:creationId xmlns:p14="http://schemas.microsoft.com/office/powerpoint/2010/main" val="1277928900"/>
+        <p14:creationId xmlns:p14="http://schemas.microsoft.com/office/powerpoint/2010/main" val="1700876418"/>
       </p:ext>
     </p:extLst>
   </p:cSld>
@@ -8250,15 +9301,7 @@
                   <a:schemeClr val="tx1"/>
                 </a:solidFill>
               </a:rPr>
-              <a:t>-Utilisation d’un Framework / bibliothèque front: </a:t>
-            </a:r>
-            <a:r>
-              <a:rPr lang="fr-FR" dirty="0" err="1">
-                <a:solidFill>
-                  <a:schemeClr val="accent3"/>
-                </a:solidFill>
-              </a:rPr>
-              <a:t>React</a:t>
+              <a:t>-Utilisation d’un Framework / bibliothèque front.</a:t>
             </a:r>
             <a:endParaRPr lang="fr-FR" dirty="0">
               <a:solidFill>
@@ -8531,15 +9574,6 @@
             <a:pPr marL="0" indent="0">
               <a:buNone/>
             </a:pPr>
-            <a:r>
-              <a:rPr lang="fr-FR" dirty="0"/>
-              <a:t>-Préférence personnelle.</a:t>
-            </a:r>
-          </a:p>
-          <a:p>
-            <a:pPr marL="0" indent="0">
-              <a:buNone/>
-            </a:pPr>
             <a:endParaRPr lang="fr-FR" dirty="0"/>
           </a:p>
           <a:p>
@@ -8595,7 +9629,7 @@
         <p:spPr>
           <a:xfrm>
             <a:off x="5417388" y="689233"/>
-            <a:ext cx="3301042" cy="3970318"/>
+            <a:ext cx="4211108" cy="5355312"/>
           </a:xfrm>
           <a:prstGeom prst="rect">
             <a:avLst/>
@@ -8696,14 +9730,56 @@
               <a:t>.</a:t>
             </a:r>
           </a:p>
+          <a:p>
+            <a:endParaRPr lang="fr-FR" dirty="0"/>
+          </a:p>
+          <a:p>
+            <a:r>
+              <a:rPr lang="fr-FR" dirty="0"/>
+              <a:t>-l’email sera unique par utilisateur.</a:t>
+            </a:r>
+          </a:p>
+          <a:p>
+            <a:endParaRPr lang="fr-FR" dirty="0"/>
+          </a:p>
+          <a:p>
+            <a:r>
+              <a:rPr lang="fr-FR" dirty="0"/>
+              <a:t>-Créations des colonnes </a:t>
+            </a:r>
+            <a:r>
+              <a:rPr lang="fr-FR" dirty="0" err="1"/>
+              <a:t>created_at</a:t>
+            </a:r>
+            <a:r>
+              <a:rPr lang="fr-FR" dirty="0"/>
+              <a:t>, </a:t>
+            </a:r>
+            <a:r>
+              <a:rPr lang="fr-FR" dirty="0" err="1"/>
+              <a:t>updated_at</a:t>
+            </a:r>
+            <a:r>
+              <a:rPr lang="fr-FR" dirty="0"/>
+              <a:t> et </a:t>
+            </a:r>
+            <a:r>
+              <a:rPr lang="fr-FR" dirty="0" err="1"/>
+              <a:t>deleted_at</a:t>
+            </a:r>
+            <a:r>
+              <a:rPr lang="fr-FR" dirty="0"/>
+              <a:t>.</a:t>
+            </a:r>
+          </a:p>
         </p:txBody>
       </p:sp>
       <p:pic>
         <p:nvPicPr>
-          <p:cNvPr id="10" name="Image 9">
+          <p:cNvPr id="3" name="Image 2">
             <a:extLst>
               <a:ext uri="{FF2B5EF4-FFF2-40B4-BE49-F238E27FC236}">
-                <a16:creationId xmlns:a16="http://schemas.microsoft.com/office/drawing/2014/main" id="{4063C149-5476-5337-7063-F0DC530F096B}"/>
+                <a16:creationId xmlns:a16="http://schemas.microsoft.com/office/drawing/2014/main" id="{989919F3-15D2-9F43-78AC-1FA454028FC8}"/>
               </a:ext>
             </a:extLst>
           </p:cNvPr>
@@ -8726,8 +9802,8 @@
         </p:blipFill>
         <p:spPr>
           <a:xfrm>
-            <a:off x="718868" y="689233"/>
-            <a:ext cx="4284157" cy="5350224"/>
+            <a:off x="765312" y="698090"/>
+            <a:ext cx="4267644" cy="5346455"/>
           </a:xfrm>
           <a:prstGeom prst="rect">
             <a:avLst/>
@@ -8903,6 +9979,155 @@
           <p:cNvPr id="3" name="Espace réservé du contenu 2">
             <a:extLst>
               <a:ext uri="{FF2B5EF4-FFF2-40B4-BE49-F238E27FC236}">
+                <a16:creationId xmlns:a16="http://schemas.microsoft.com/office/drawing/2014/main" id="{EC4D02BD-0D74-B916-D28A-F03AEE9AEFB1}"/>
+              </a:ext>
+            </a:extLst>
+          </p:cNvPr>
+          <p:cNvSpPr>
+            <a:spLocks noGrp="1"/>
+          </p:cNvSpPr>
+          <p:nvPr>
+            <p:ph idx="1"/>
+          </p:nvPr>
+        </p:nvSpPr>
+        <p:spPr>
+          <a:xfrm>
+            <a:off x="1024044" y="1587357"/>
+            <a:ext cx="4161794" cy="5435187"/>
+          </a:xfrm>
+        </p:spPr>
+        <p:txBody>
+          <a:bodyPr/>
+          <a:lstStyle/>
+          <a:p>
+            <a:r>
+              <a:rPr lang="fr-FR" dirty="0"/>
+              <a:t>Structuration du projet: </a:t>
+            </a:r>
+          </a:p>
+          <a:p>
+            <a:pPr marL="0" indent="0">
+              <a:buNone/>
+            </a:pPr>
+            <a:r>
+              <a:rPr lang="fr-FR" dirty="0"/>
+              <a:t>-Architecture Express classique</a:t>
+            </a:r>
+          </a:p>
+          <a:p>
+            <a:pPr marL="0" indent="0">
+              <a:buNone/>
+            </a:pPr>
+            <a:r>
+              <a:rPr lang="fr-FR" dirty="0"/>
+              <a:t>-Séparation des logiques métiers, logiques de routes.</a:t>
+            </a:r>
+          </a:p>
+          <a:p>
+            <a:pPr marL="0" indent="0">
+              <a:buNone/>
+            </a:pPr>
+            <a:r>
+              <a:rPr lang="fr-FR" dirty="0"/>
+              <a:t>-Séparation des middlewares</a:t>
+            </a:r>
+          </a:p>
+          <a:p>
+            <a:pPr>
+              <a:buFont typeface="Symbol" panose="05050102010706020507" pitchFamily="18" charset="2"/>
+              <a:buChar char="Þ"/>
+            </a:pPr>
+            <a:r>
+              <a:rPr lang="fr-FR" dirty="0"/>
+              <a:t>Facilitation de l’identification des bugs</a:t>
+            </a:r>
+          </a:p>
+          <a:p>
+            <a:pPr marL="0" indent="0">
+              <a:buNone/>
+            </a:pPr>
+            <a:r>
+              <a:rPr lang="fr-FR" dirty="0"/>
+              <a:t>-Création d’un dossier test qui contiendra tout nos </a:t>
+            </a:r>
+            <a:r>
+              <a:rPr lang="fr-FR"/>
+              <a:t>tests unitaires</a:t>
+            </a:r>
+          </a:p>
+        </p:txBody>
+      </p:sp>
+      <p:pic>
+        <p:nvPicPr>
+          <p:cNvPr id="5" name="Image 4">
+            <a:extLst>
+              <a:ext uri="{FF2B5EF4-FFF2-40B4-BE49-F238E27FC236}">
+                <a16:creationId xmlns:a16="http://schemas.microsoft.com/office/drawing/2014/main" id="{1400604E-85F7-9F36-F580-A4C23267FA02}"/>
+              </a:ext>
+            </a:extLst>
+          </p:cNvPr>
+          <p:cNvPicPr>
+            <a:picLocks noChangeAspect="1"/>
+          </p:cNvPicPr>
+          <p:nvPr/>
+        </p:nvPicPr>
+        <p:blipFill>
+          <a:blip r:embed="rId2">
+            <a:extLst>
+              <a:ext uri="{28A0092B-C50C-407E-A947-70E740481C1C}">
+                <a14:useLocalDpi xmlns:a14="http://schemas.microsoft.com/office/drawing/2010/main" val="0"/>
+              </a:ext>
+            </a:extLst>
+          </a:blip>
+          <a:stretch>
+            <a:fillRect/>
+          </a:stretch>
+        </p:blipFill>
+        <p:spPr>
+          <a:xfrm>
+            <a:off x="5947924" y="1657337"/>
+            <a:ext cx="2505093" cy="3543326"/>
+          </a:xfrm>
+          <a:prstGeom prst="rect">
+            <a:avLst/>
+          </a:prstGeom>
+        </p:spPr>
+      </p:pic>
+    </p:spTree>
+    <p:extLst>
+      <p:ext uri="{BB962C8B-B14F-4D97-AF65-F5344CB8AC3E}">
+        <p14:creationId xmlns:p14="http://schemas.microsoft.com/office/powerpoint/2010/main" val="1441765306"/>
+      </p:ext>
+    </p:extLst>
+  </p:cSld>
+  <p:clrMapOvr>
+    <a:masterClrMapping/>
+  </p:clrMapOvr>
+</p:sld>
+</file>
+
+<file path=ppt/slides/slide9.xml><?xml version="1.0" encoding="utf-8"?>
+<p:sld xmlns:a="http://schemas.openxmlformats.org/drawingml/2006/main" xmlns:r="http://schemas.openxmlformats.org/officeDocument/2006/relationships" xmlns:p="http://schemas.openxmlformats.org/presentationml/2006/main">
+  <p:cSld>
+    <p:spTree>
+      <p:nvGrpSpPr>
+        <p:cNvPr id="1" name=""/>
+        <p:cNvGrpSpPr/>
+        <p:nvPr/>
+      </p:nvGrpSpPr>
+      <p:grpSpPr>
+        <a:xfrm>
+          <a:off x="0" y="0"/>
+          <a:ext cx="0" cy="0"/>
+          <a:chOff x="0" y="0"/>
+          <a:chExt cx="0" cy="0"/>
+        </a:xfrm>
+      </p:grpSpPr>
+      <p:sp>
+        <p:nvSpPr>
+          <p:cNvPr id="3" name="Espace réservé du contenu 2">
+            <a:extLst>
+              <a:ext uri="{FF2B5EF4-FFF2-40B4-BE49-F238E27FC236}">
                 <a16:creationId xmlns:a16="http://schemas.microsoft.com/office/drawing/2014/main" id="{076FC695-F87D-BBC2-91B8-FB0C8EE87B41}"/>
               </a:ext>
             </a:extLst>
@@ -8916,7 +10141,7 @@
         </p:nvSpPr>
         <p:spPr>
           <a:xfrm>
-            <a:off x="677334" y="402567"/>
+            <a:off x="667394" y="680863"/>
             <a:ext cx="4067194" cy="5638796"/>
           </a:xfrm>
         </p:spPr>
@@ -9071,7 +10296,7 @@
         </p:blipFill>
         <p:spPr>
           <a:xfrm>
-            <a:off x="4961567" y="954657"/>
+            <a:off x="4991385" y="1207698"/>
             <a:ext cx="4408448" cy="4028533"/>
           </a:xfrm>
           <a:prstGeom prst="rect">
@@ -9083,185 +10308,6 @@
     <p:extLst>
       <p:ext uri="{BB962C8B-B14F-4D97-AF65-F5344CB8AC3E}">
         <p14:creationId xmlns:p14="http://schemas.microsoft.com/office/powerpoint/2010/main" val="922817345"/>
-      </p:ext>
-    </p:extLst>
-  </p:cSld>
-  <p:clrMapOvr>
-    <a:masterClrMapping/>
-  </p:clrMapOvr>
-</p:sld>
-</file>
-
-<file path=ppt/slides/slide9.xml><?xml version="1.0" encoding="utf-8"?>
-<p:sld xmlns:a="http://schemas.openxmlformats.org/drawingml/2006/main" xmlns:r="http://schemas.openxmlformats.org/officeDocument/2006/relationships" xmlns:p="http://schemas.openxmlformats.org/presentationml/2006/main">
-  <p:cSld>
-    <p:spTree>
-      <p:nvGrpSpPr>
-        <p:cNvPr id="1" name=""/>
-        <p:cNvGrpSpPr/>
-        <p:nvPr/>
-      </p:nvGrpSpPr>
-      <p:grpSpPr>
-        <a:xfrm>
-          <a:off x="0" y="0"/>
-          <a:ext cx="0" cy="0"/>
-          <a:chOff x="0" y="0"/>
-          <a:chExt cx="0" cy="0"/>
-        </a:xfrm>
-      </p:grpSpPr>
-      <p:sp>
-        <p:nvSpPr>
-          <p:cNvPr id="3" name="Espace réservé du contenu 2">
-            <a:extLst>
-              <a:ext uri="{FF2B5EF4-FFF2-40B4-BE49-F238E27FC236}">
-                <a16:creationId xmlns:a16="http://schemas.microsoft.com/office/drawing/2014/main" id="{669E923B-9B13-5BC0-740A-F1E04CDDBBCD}"/>
-              </a:ext>
-            </a:extLst>
-          </p:cNvPr>
-          <p:cNvSpPr>
-            <a:spLocks noGrp="1"/>
-          </p:cNvSpPr>
-          <p:nvPr>
-            <p:ph idx="1"/>
-          </p:nvPr>
-        </p:nvSpPr>
-        <p:spPr>
-          <a:xfrm>
-            <a:off x="677335" y="684363"/>
-            <a:ext cx="3733640" cy="5357000"/>
-          </a:xfrm>
-        </p:spPr>
-        <p:txBody>
-          <a:bodyPr/>
-          <a:lstStyle/>
-          <a:p>
-            <a:r>
-              <a:rPr lang="fr-FR" dirty="0"/>
-              <a:t>Etape 2: Configuration des modèles</a:t>
-            </a:r>
-          </a:p>
-          <a:p>
-            <a:pPr marL="0" indent="0">
-              <a:buNone/>
-            </a:pPr>
-            <a:r>
-              <a:rPr lang="fr-FR" dirty="0"/>
-              <a:t>Utilisation de </a:t>
-            </a:r>
-            <a:r>
-              <a:rPr lang="fr-FR" dirty="0" err="1"/>
-              <a:t>Sequelize</a:t>
-            </a:r>
-            <a:r>
-              <a:rPr lang="fr-FR" dirty="0"/>
-              <a:t> pour définir la structure des modèles accordement à la BDD. </a:t>
-            </a:r>
-          </a:p>
-          <a:p>
-            <a:pPr marL="0" indent="0">
-              <a:buNone/>
-            </a:pPr>
-            <a:r>
-              <a:rPr lang="fr-FR" dirty="0"/>
-              <a:t>Création d’un fichier modelIndex.js pour définir les relations entre les modèles.</a:t>
-            </a:r>
-          </a:p>
-          <a:p>
-            <a:pPr marL="0" indent="0">
-              <a:buNone/>
-            </a:pPr>
-            <a:endParaRPr lang="fr-FR" dirty="0"/>
-          </a:p>
-          <a:p>
-            <a:pPr marL="0" indent="0">
-              <a:buNone/>
-            </a:pPr>
-            <a:endParaRPr lang="fr-FR" dirty="0"/>
-          </a:p>
-          <a:p>
-            <a:pPr marL="0" indent="0">
-              <a:buNone/>
-            </a:pPr>
-            <a:endParaRPr lang="fr-FR" dirty="0"/>
-          </a:p>
-        </p:txBody>
-      </p:sp>
-      <p:pic>
-        <p:nvPicPr>
-          <p:cNvPr id="7" name="Image 6">
-            <a:extLst>
-              <a:ext uri="{FF2B5EF4-FFF2-40B4-BE49-F238E27FC236}">
-                <a16:creationId xmlns:a16="http://schemas.microsoft.com/office/drawing/2014/main" id="{A2A7FA17-8C4F-CA97-1915-78A48A913BEA}"/>
-              </a:ext>
-            </a:extLst>
-          </p:cNvPr>
-          <p:cNvPicPr>
-            <a:picLocks noChangeAspect="1"/>
-          </p:cNvPicPr>
-          <p:nvPr/>
-        </p:nvPicPr>
-        <p:blipFill>
-          <a:blip r:embed="rId2">
-            <a:extLst>
-              <a:ext uri="{28A0092B-C50C-407E-A947-70E740481C1C}">
-                <a14:useLocalDpi xmlns:a14="http://schemas.microsoft.com/office/drawing/2010/main" val="0"/>
-              </a:ext>
-            </a:extLst>
-          </a:blip>
-          <a:stretch>
-            <a:fillRect/>
-          </a:stretch>
-        </p:blipFill>
-        <p:spPr>
-          <a:xfrm>
-            <a:off x="4817680" y="505652"/>
-            <a:ext cx="3744354" cy="1834982"/>
-          </a:xfrm>
-          <a:prstGeom prst="rect">
-            <a:avLst/>
-          </a:prstGeom>
-        </p:spPr>
-      </p:pic>
-      <p:pic>
-        <p:nvPicPr>
-          <p:cNvPr id="9" name="Image 8">
-            <a:extLst>
-              <a:ext uri="{FF2B5EF4-FFF2-40B4-BE49-F238E27FC236}">
-                <a16:creationId xmlns:a16="http://schemas.microsoft.com/office/drawing/2014/main" id="{D5F88461-B944-8FA4-BA3D-3CFAE5398947}"/>
-              </a:ext>
-            </a:extLst>
-          </p:cNvPr>
-          <p:cNvPicPr>
-            <a:picLocks noChangeAspect="1"/>
-          </p:cNvPicPr>
-          <p:nvPr/>
-        </p:nvPicPr>
-        <p:blipFill>
-          <a:blip r:embed="rId3">
-            <a:extLst>
-              <a:ext uri="{28A0092B-C50C-407E-A947-70E740481C1C}">
-                <a14:useLocalDpi xmlns:a14="http://schemas.microsoft.com/office/drawing/2010/main" val="0"/>
-              </a:ext>
-            </a:extLst>
-          </a:blip>
-          <a:stretch>
-            <a:fillRect/>
-          </a:stretch>
-        </p:blipFill>
-        <p:spPr>
-          <a:xfrm>
-            <a:off x="4817680" y="2724615"/>
-            <a:ext cx="3733640" cy="3843615"/>
-          </a:xfrm>
-          <a:prstGeom prst="rect">
-            <a:avLst/>
-          </a:prstGeom>
-        </p:spPr>
-      </p:pic>
-    </p:spTree>
-    <p:extLst>
-      <p:ext uri="{BB962C8B-B14F-4D97-AF65-F5344CB8AC3E}">
-        <p14:creationId xmlns:p14="http://schemas.microsoft.com/office/powerpoint/2010/main" val="2476426381"/>
       </p:ext>
     </p:extLst>
   </p:cSld>

</xml_diff>